<commit_message>
Feat : Final ppt
</commit_message>
<xml_diff>
--- a/presentation/final.pptx
+++ b/presentation/final.pptx
@@ -5,7 +5,7 @@
     <p:sldMasterId id="2147483648" r:id="rId1"/>
   </p:sldMasterIdLst>
   <p:notesMasterIdLst>
-    <p:notesMasterId r:id="rId20"/>
+    <p:notesMasterId r:id="rId21"/>
   </p:notesMasterIdLst>
   <p:sldIdLst>
     <p:sldId id="257" r:id="rId2"/>
@@ -25,7 +25,8 @@
     <p:sldId id="303" r:id="rId16"/>
     <p:sldId id="305" r:id="rId17"/>
     <p:sldId id="302" r:id="rId18"/>
-    <p:sldId id="266" r:id="rId19"/>
+    <p:sldId id="307" r:id="rId19"/>
+    <p:sldId id="266" r:id="rId20"/>
   </p:sldIdLst>
   <p:sldSz cx="12192000" cy="6858000"/>
   <p:notesSz cx="6858000" cy="9144000"/>
@@ -272,7 +273,7 @@
           <a:p>
             <a:fld id="{1F128C8A-7665-2E48-AE79-3C17475A6744}" type="datetimeFigureOut">
               <a:rPr lang="en-US" smtClean="0"/>
-              <a:t>12/25/2018</a:t>
+              <a:t>12/26/18</a:t>
             </a:fld>
             <a:endParaRPr lang="en-US"/>
           </a:p>
@@ -752,7 +753,7 @@
           <a:p>
             <a:fld id="{CF82F7AB-E95A-0844-8073-FE3960868F46}" type="datetimeFigureOut">
               <a:rPr lang="en-US" smtClean="0"/>
-              <a:t>12/25/2018</a:t>
+              <a:t>12/26/18</a:t>
             </a:fld>
             <a:endParaRPr lang="en-US"/>
           </a:p>
@@ -920,7 +921,7 @@
           <a:p>
             <a:fld id="{CF82F7AB-E95A-0844-8073-FE3960868F46}" type="datetimeFigureOut">
               <a:rPr lang="en-US" smtClean="0"/>
-              <a:t>12/25/2018</a:t>
+              <a:t>12/26/18</a:t>
             </a:fld>
             <a:endParaRPr lang="en-US"/>
           </a:p>
@@ -1098,7 +1099,7 @@
           <a:p>
             <a:fld id="{CF82F7AB-E95A-0844-8073-FE3960868F46}" type="datetimeFigureOut">
               <a:rPr lang="en-US" smtClean="0"/>
-              <a:t>12/25/2018</a:t>
+              <a:t>12/26/18</a:t>
             </a:fld>
             <a:endParaRPr lang="en-US"/>
           </a:p>
@@ -1266,7 +1267,7 @@
           <a:p>
             <a:fld id="{CF82F7AB-E95A-0844-8073-FE3960868F46}" type="datetimeFigureOut">
               <a:rPr lang="en-US" smtClean="0"/>
-              <a:t>12/25/2018</a:t>
+              <a:t>12/26/18</a:t>
             </a:fld>
             <a:endParaRPr lang="en-US"/>
           </a:p>
@@ -1511,7 +1512,7 @@
           <a:p>
             <a:fld id="{CF82F7AB-E95A-0844-8073-FE3960868F46}" type="datetimeFigureOut">
               <a:rPr lang="en-US" smtClean="0"/>
-              <a:t>12/25/2018</a:t>
+              <a:t>12/26/18</a:t>
             </a:fld>
             <a:endParaRPr lang="en-US"/>
           </a:p>
@@ -1740,7 +1741,7 @@
           <a:p>
             <a:fld id="{CF82F7AB-E95A-0844-8073-FE3960868F46}" type="datetimeFigureOut">
               <a:rPr lang="en-US" smtClean="0"/>
-              <a:t>12/25/2018</a:t>
+              <a:t>12/26/18</a:t>
             </a:fld>
             <a:endParaRPr lang="en-US"/>
           </a:p>
@@ -2104,7 +2105,7 @@
           <a:p>
             <a:fld id="{CF82F7AB-E95A-0844-8073-FE3960868F46}" type="datetimeFigureOut">
               <a:rPr lang="en-US" smtClean="0"/>
-              <a:t>12/25/2018</a:t>
+              <a:t>12/26/18</a:t>
             </a:fld>
             <a:endParaRPr lang="en-US"/>
           </a:p>
@@ -2221,7 +2222,7 @@
           <a:p>
             <a:fld id="{CF82F7AB-E95A-0844-8073-FE3960868F46}" type="datetimeFigureOut">
               <a:rPr lang="en-US" smtClean="0"/>
-              <a:t>12/25/2018</a:t>
+              <a:t>12/26/18</a:t>
             </a:fld>
             <a:endParaRPr lang="en-US"/>
           </a:p>
@@ -2316,7 +2317,7 @@
           <a:p>
             <a:fld id="{CF82F7AB-E95A-0844-8073-FE3960868F46}" type="datetimeFigureOut">
               <a:rPr lang="en-US" smtClean="0"/>
-              <a:t>12/25/2018</a:t>
+              <a:t>12/26/18</a:t>
             </a:fld>
             <a:endParaRPr lang="en-US"/>
           </a:p>
@@ -2591,7 +2592,7 @@
           <a:p>
             <a:fld id="{CF82F7AB-E95A-0844-8073-FE3960868F46}" type="datetimeFigureOut">
               <a:rPr lang="en-US" smtClean="0"/>
-              <a:t>12/25/2018</a:t>
+              <a:t>12/26/18</a:t>
             </a:fld>
             <a:endParaRPr lang="en-US"/>
           </a:p>
@@ -2843,7 +2844,7 @@
           <a:p>
             <a:fld id="{CF82F7AB-E95A-0844-8073-FE3960868F46}" type="datetimeFigureOut">
               <a:rPr lang="en-US" smtClean="0"/>
-              <a:t>12/25/2018</a:t>
+              <a:t>12/26/18</a:t>
             </a:fld>
             <a:endParaRPr lang="en-US"/>
           </a:p>
@@ -3054,7 +3055,7 @@
           <a:p>
             <a:fld id="{CF82F7AB-E95A-0844-8073-FE3960868F46}" type="datetimeFigureOut">
               <a:rPr lang="en-US" smtClean="0"/>
-              <a:t>12/25/2018</a:t>
+              <a:t>12/26/18</a:t>
             </a:fld>
             <a:endParaRPr lang="en-US"/>
           </a:p>
@@ -3464,7 +3465,7 @@
           <p:cNvPr id="26" name="사각형: 둥근 모서리 25">
             <a:extLst>
               <a:ext uri="{FF2B5EF4-FFF2-40B4-BE49-F238E27FC236}">
-                <a16:creationId xmlns:a16="http://schemas.microsoft.com/office/drawing/2014/main" id="{6EF4AACF-BF98-4D1B-815E-F2B21068B69C}"/>
+                <a16:creationId xmlns:a16="http://schemas.microsoft.com/office/drawing/2014/main" xmlns="" id="{6EF4AACF-BF98-4D1B-815E-F2B21068B69C}"/>
               </a:ext>
             </a:extLst>
           </p:cNvPr>
@@ -3528,7 +3529,7 @@
           <p:cNvPr id="25" name="사각형: 둥근 모서리 24">
             <a:extLst>
               <a:ext uri="{FF2B5EF4-FFF2-40B4-BE49-F238E27FC236}">
-                <a16:creationId xmlns:a16="http://schemas.microsoft.com/office/drawing/2014/main" id="{2B540C0C-C67A-4CCA-936F-6F1BF9B33AA6}"/>
+                <a16:creationId xmlns:a16="http://schemas.microsoft.com/office/drawing/2014/main" xmlns="" id="{2B540C0C-C67A-4CCA-936F-6F1BF9B33AA6}"/>
               </a:ext>
             </a:extLst>
           </p:cNvPr>
@@ -3592,7 +3593,7 @@
           <p:cNvPr id="11" name="TextBox 10">
             <a:extLst>
               <a:ext uri="{FF2B5EF4-FFF2-40B4-BE49-F238E27FC236}">
-                <a16:creationId xmlns:a16="http://schemas.microsoft.com/office/drawing/2014/main" id="{5F5C2694-2958-48AC-A495-3A4D740A8E48}"/>
+                <a16:creationId xmlns:a16="http://schemas.microsoft.com/office/drawing/2014/main" xmlns="" id="{5F5C2694-2958-48AC-A495-3A4D740A8E48}"/>
               </a:ext>
             </a:extLst>
           </p:cNvPr>
@@ -3645,7 +3646,7 @@
           <p:cNvPr id="12" name="TextBox 11">
             <a:extLst>
               <a:ext uri="{FF2B5EF4-FFF2-40B4-BE49-F238E27FC236}">
-                <a16:creationId xmlns:a16="http://schemas.microsoft.com/office/drawing/2014/main" id="{AFFF3868-DADC-439E-953C-BAD4581A3B8A}"/>
+                <a16:creationId xmlns:a16="http://schemas.microsoft.com/office/drawing/2014/main" xmlns="" id="{AFFF3868-DADC-439E-953C-BAD4581A3B8A}"/>
               </a:ext>
             </a:extLst>
           </p:cNvPr>
@@ -3706,7 +3707,7 @@
               <p14:cNvPr id="14" name="잉크 13">
                 <a:extLst>
                   <a:ext uri="{FF2B5EF4-FFF2-40B4-BE49-F238E27FC236}">
-                    <a16:creationId xmlns:a16="http://schemas.microsoft.com/office/drawing/2014/main" id="{B55D4335-1F91-4444-A146-73388C8EF92F}"/>
+                    <a16:creationId xmlns:a16="http://schemas.microsoft.com/office/drawing/2014/main" xmlns="" id="{B55D4335-1F91-4444-A146-73388C8EF92F}"/>
                   </a:ext>
                 </a:extLst>
               </p14:cNvPr>
@@ -3755,7 +3756,7 @@
           <p:cNvPr id="27" name="직사각형 26">
             <a:extLst>
               <a:ext uri="{FF2B5EF4-FFF2-40B4-BE49-F238E27FC236}">
-                <a16:creationId xmlns:a16="http://schemas.microsoft.com/office/drawing/2014/main" id="{7B485AC3-93BA-4C5D-BD3E-4C24FE11A689}"/>
+                <a16:creationId xmlns:a16="http://schemas.microsoft.com/office/drawing/2014/main" xmlns="" id="{7B485AC3-93BA-4C5D-BD3E-4C24FE11A689}"/>
               </a:ext>
             </a:extLst>
           </p:cNvPr>
@@ -3811,7 +3812,7 @@
           <p:cNvPr id="2" name="TextBox 1">
             <a:extLst>
               <a:ext uri="{FF2B5EF4-FFF2-40B4-BE49-F238E27FC236}">
-                <a16:creationId xmlns:a16="http://schemas.microsoft.com/office/drawing/2014/main" id="{046AE835-647E-4C28-AD79-943FAA6BB463}"/>
+                <a16:creationId xmlns:a16="http://schemas.microsoft.com/office/drawing/2014/main" xmlns="" id="{046AE835-647E-4C28-AD79-943FAA6BB463}"/>
               </a:ext>
             </a:extLst>
           </p:cNvPr>
@@ -4073,7 +4074,7 @@
           <p:cNvPr id="6" name="그룹 5">
             <a:extLst>
               <a:ext uri="{FF2B5EF4-FFF2-40B4-BE49-F238E27FC236}">
-                <a16:creationId xmlns:a16="http://schemas.microsoft.com/office/drawing/2014/main" id="{A87738A6-DCCB-44F8-BC8F-5630746B8082}"/>
+                <a16:creationId xmlns:a16="http://schemas.microsoft.com/office/drawing/2014/main" xmlns="" id="{A87738A6-DCCB-44F8-BC8F-5630746B8082}"/>
               </a:ext>
             </a:extLst>
           </p:cNvPr>
@@ -4093,7 +4094,7 @@
             <p:cNvPr id="3" name="TextBox 2">
               <a:extLst>
                 <a:ext uri="{FF2B5EF4-FFF2-40B4-BE49-F238E27FC236}">
-                  <a16:creationId xmlns:a16="http://schemas.microsoft.com/office/drawing/2014/main" id="{3F15D2F0-3EF3-4014-88BD-F1E9CEE28153}"/>
+                  <a16:creationId xmlns:a16="http://schemas.microsoft.com/office/drawing/2014/main" xmlns="" id="{3F15D2F0-3EF3-4014-88BD-F1E9CEE28153}"/>
                 </a:ext>
               </a:extLst>
             </p:cNvPr>
@@ -4151,7 +4152,7 @@
             <p:cNvPr id="4" name="TextBox 3">
               <a:extLst>
                 <a:ext uri="{FF2B5EF4-FFF2-40B4-BE49-F238E27FC236}">
-                  <a16:creationId xmlns:a16="http://schemas.microsoft.com/office/drawing/2014/main" id="{EE9EE9DD-4219-4C6F-BCF5-B48D9535E62E}"/>
+                  <a16:creationId xmlns:a16="http://schemas.microsoft.com/office/drawing/2014/main" xmlns="" id="{EE9EE9DD-4219-4C6F-BCF5-B48D9535E62E}"/>
                 </a:ext>
               </a:extLst>
             </p:cNvPr>
@@ -4221,7 +4222,7 @@
           <p:cNvPr id="9" name="직사각형 8">
             <a:extLst>
               <a:ext uri="{FF2B5EF4-FFF2-40B4-BE49-F238E27FC236}">
-                <a16:creationId xmlns:a16="http://schemas.microsoft.com/office/drawing/2014/main" id="{B946531F-0ED7-40C3-B576-4F56E0B23959}"/>
+                <a16:creationId xmlns:a16="http://schemas.microsoft.com/office/drawing/2014/main" xmlns="" id="{B946531F-0ED7-40C3-B576-4F56E0B23959}"/>
               </a:ext>
             </a:extLst>
           </p:cNvPr>
@@ -4275,7 +4276,7 @@
           <p:cNvPr id="24" name="직각 삼각형 23">
             <a:extLst>
               <a:ext uri="{FF2B5EF4-FFF2-40B4-BE49-F238E27FC236}">
-                <a16:creationId xmlns:a16="http://schemas.microsoft.com/office/drawing/2014/main" id="{A21687B3-DD91-4897-B11B-1D36E99F5FBD}"/>
+                <a16:creationId xmlns:a16="http://schemas.microsoft.com/office/drawing/2014/main" xmlns="" id="{A21687B3-DD91-4897-B11B-1D36E99F5FBD}"/>
               </a:ext>
             </a:extLst>
           </p:cNvPr>
@@ -4327,7 +4328,7 @@
           <p:cNvPr id="18" name="직사각형 17">
             <a:extLst>
               <a:ext uri="{FF2B5EF4-FFF2-40B4-BE49-F238E27FC236}">
-                <a16:creationId xmlns:a16="http://schemas.microsoft.com/office/drawing/2014/main" id="{FC56DBEE-CFA2-427D-A54E-C69EBB5FAD8F}"/>
+                <a16:creationId xmlns:a16="http://schemas.microsoft.com/office/drawing/2014/main" xmlns="" id="{FC56DBEE-CFA2-427D-A54E-C69EBB5FAD8F}"/>
               </a:ext>
             </a:extLst>
           </p:cNvPr>
@@ -4381,7 +4382,7 @@
           <p:cNvPr id="16" name="이등변 삼각형 15">
             <a:extLst>
               <a:ext uri="{FF2B5EF4-FFF2-40B4-BE49-F238E27FC236}">
-                <a16:creationId xmlns:a16="http://schemas.microsoft.com/office/drawing/2014/main" id="{6A579E04-95AD-4A49-B2DC-F82AC5E07A92}"/>
+                <a16:creationId xmlns:a16="http://schemas.microsoft.com/office/drawing/2014/main" xmlns="" id="{6A579E04-95AD-4A49-B2DC-F82AC5E07A92}"/>
               </a:ext>
             </a:extLst>
           </p:cNvPr>
@@ -4808,7 +4809,7 @@
           <p:cNvPr id="26" name="사각형: 둥근 모서리 25">
             <a:extLst>
               <a:ext uri="{FF2B5EF4-FFF2-40B4-BE49-F238E27FC236}">
-                <a16:creationId xmlns:a16="http://schemas.microsoft.com/office/drawing/2014/main" id="{6EF4AACF-BF98-4D1B-815E-F2B21068B69C}"/>
+                <a16:creationId xmlns:a16="http://schemas.microsoft.com/office/drawing/2014/main" xmlns="" id="{6EF4AACF-BF98-4D1B-815E-F2B21068B69C}"/>
               </a:ext>
             </a:extLst>
           </p:cNvPr>
@@ -4872,7 +4873,7 @@
           <p:cNvPr id="25" name="사각형: 둥근 모서리 24">
             <a:extLst>
               <a:ext uri="{FF2B5EF4-FFF2-40B4-BE49-F238E27FC236}">
-                <a16:creationId xmlns:a16="http://schemas.microsoft.com/office/drawing/2014/main" id="{2B540C0C-C67A-4CCA-936F-6F1BF9B33AA6}"/>
+                <a16:creationId xmlns:a16="http://schemas.microsoft.com/office/drawing/2014/main" xmlns="" id="{2B540C0C-C67A-4CCA-936F-6F1BF9B33AA6}"/>
               </a:ext>
             </a:extLst>
           </p:cNvPr>
@@ -4936,7 +4937,7 @@
           <p:cNvPr id="11" name="TextBox 10">
             <a:extLst>
               <a:ext uri="{FF2B5EF4-FFF2-40B4-BE49-F238E27FC236}">
-                <a16:creationId xmlns:a16="http://schemas.microsoft.com/office/drawing/2014/main" id="{5F5C2694-2958-48AC-A495-3A4D740A8E48}"/>
+                <a16:creationId xmlns:a16="http://schemas.microsoft.com/office/drawing/2014/main" xmlns="" id="{5F5C2694-2958-48AC-A495-3A4D740A8E48}"/>
               </a:ext>
             </a:extLst>
           </p:cNvPr>
@@ -4980,7 +4981,7 @@
           <p:cNvPr id="27" name="직사각형 26">
             <a:extLst>
               <a:ext uri="{FF2B5EF4-FFF2-40B4-BE49-F238E27FC236}">
-                <a16:creationId xmlns:a16="http://schemas.microsoft.com/office/drawing/2014/main" id="{7B485AC3-93BA-4C5D-BD3E-4C24FE11A689}"/>
+                <a16:creationId xmlns:a16="http://schemas.microsoft.com/office/drawing/2014/main" xmlns="" id="{7B485AC3-93BA-4C5D-BD3E-4C24FE11A689}"/>
               </a:ext>
             </a:extLst>
           </p:cNvPr>
@@ -5036,7 +5037,7 @@
           <p:cNvPr id="9" name="사각형: 둥근 모서리 25">
             <a:extLst>
               <a:ext uri="{FF2B5EF4-FFF2-40B4-BE49-F238E27FC236}">
-                <a16:creationId xmlns:a16="http://schemas.microsoft.com/office/drawing/2014/main" id="{6EF4AACF-BF98-4D1B-815E-F2B21068B69C}"/>
+                <a16:creationId xmlns:a16="http://schemas.microsoft.com/office/drawing/2014/main" xmlns="" id="{6EF4AACF-BF98-4D1B-815E-F2B21068B69C}"/>
               </a:ext>
             </a:extLst>
           </p:cNvPr>
@@ -5100,7 +5101,7 @@
           <p:cNvPr id="10" name="TextBox 9">
             <a:extLst>
               <a:ext uri="{FF2B5EF4-FFF2-40B4-BE49-F238E27FC236}">
-                <a16:creationId xmlns:a16="http://schemas.microsoft.com/office/drawing/2014/main" id="{AFFF3868-DADC-439E-953C-BAD4581A3B8A}"/>
+                <a16:creationId xmlns:a16="http://schemas.microsoft.com/office/drawing/2014/main" xmlns="" id="{AFFF3868-DADC-439E-953C-BAD4581A3B8A}"/>
               </a:ext>
             </a:extLst>
           </p:cNvPr>
@@ -5226,7 +5227,7 @@
           <p:cNvPr id="15" name="TextBox 14">
             <a:extLst>
               <a:ext uri="{FF2B5EF4-FFF2-40B4-BE49-F238E27FC236}">
-                <a16:creationId xmlns:a16="http://schemas.microsoft.com/office/drawing/2014/main" id="{AFFF3868-DADC-439E-953C-BAD4581A3B8A}"/>
+                <a16:creationId xmlns:a16="http://schemas.microsoft.com/office/drawing/2014/main" xmlns="" id="{AFFF3868-DADC-439E-953C-BAD4581A3B8A}"/>
               </a:ext>
             </a:extLst>
           </p:cNvPr>
@@ -5361,7 +5362,7 @@
           <p:cNvPr id="6" name="그룹 5">
             <a:extLst>
               <a:ext uri="{FF2B5EF4-FFF2-40B4-BE49-F238E27FC236}">
-                <a16:creationId xmlns:a16="http://schemas.microsoft.com/office/drawing/2014/main" id="{A87738A6-DCCB-44F8-BC8F-5630746B8082}"/>
+                <a16:creationId xmlns:a16="http://schemas.microsoft.com/office/drawing/2014/main" xmlns="" id="{A87738A6-DCCB-44F8-BC8F-5630746B8082}"/>
               </a:ext>
             </a:extLst>
           </p:cNvPr>
@@ -5381,7 +5382,7 @@
             <p:cNvPr id="3" name="TextBox 2">
               <a:extLst>
                 <a:ext uri="{FF2B5EF4-FFF2-40B4-BE49-F238E27FC236}">
-                  <a16:creationId xmlns:a16="http://schemas.microsoft.com/office/drawing/2014/main" id="{3F15D2F0-3EF3-4014-88BD-F1E9CEE28153}"/>
+                  <a16:creationId xmlns:a16="http://schemas.microsoft.com/office/drawing/2014/main" xmlns="" id="{3F15D2F0-3EF3-4014-88BD-F1E9CEE28153}"/>
                 </a:ext>
               </a:extLst>
             </p:cNvPr>
@@ -5429,7 +5430,7 @@
             <p:cNvPr id="4" name="TextBox 3">
               <a:extLst>
                 <a:ext uri="{FF2B5EF4-FFF2-40B4-BE49-F238E27FC236}">
-                  <a16:creationId xmlns:a16="http://schemas.microsoft.com/office/drawing/2014/main" id="{EE9EE9DD-4219-4C6F-BCF5-B48D9535E62E}"/>
+                  <a16:creationId xmlns:a16="http://schemas.microsoft.com/office/drawing/2014/main" xmlns="" id="{EE9EE9DD-4219-4C6F-BCF5-B48D9535E62E}"/>
                 </a:ext>
               </a:extLst>
             </p:cNvPr>
@@ -5499,7 +5500,7 @@
           <p:cNvPr id="9" name="직사각형 8">
             <a:extLst>
               <a:ext uri="{FF2B5EF4-FFF2-40B4-BE49-F238E27FC236}">
-                <a16:creationId xmlns:a16="http://schemas.microsoft.com/office/drawing/2014/main" id="{B946531F-0ED7-40C3-B576-4F56E0B23959}"/>
+                <a16:creationId xmlns:a16="http://schemas.microsoft.com/office/drawing/2014/main" xmlns="" id="{B946531F-0ED7-40C3-B576-4F56E0B23959}"/>
               </a:ext>
             </a:extLst>
           </p:cNvPr>
@@ -5553,7 +5554,7 @@
           <p:cNvPr id="24" name="직각 삼각형 23">
             <a:extLst>
               <a:ext uri="{FF2B5EF4-FFF2-40B4-BE49-F238E27FC236}">
-                <a16:creationId xmlns:a16="http://schemas.microsoft.com/office/drawing/2014/main" id="{A21687B3-DD91-4897-B11B-1D36E99F5FBD}"/>
+                <a16:creationId xmlns:a16="http://schemas.microsoft.com/office/drawing/2014/main" xmlns="" id="{A21687B3-DD91-4897-B11B-1D36E99F5FBD}"/>
               </a:ext>
             </a:extLst>
           </p:cNvPr>
@@ -5606,7 +5607,7 @@
             <a:hlinkClick r:id="" action="ppaction://media"/>
             <a:extLst>
               <a:ext uri="{FF2B5EF4-FFF2-40B4-BE49-F238E27FC236}">
-                <a16:creationId xmlns:a16="http://schemas.microsoft.com/office/drawing/2014/main" id="{49523D52-D0FE-45D1-B960-D53508FE85AF}"/>
+                <a16:creationId xmlns:a16="http://schemas.microsoft.com/office/drawing/2014/main" xmlns="" id="{49523D52-D0FE-45D1-B960-D53508FE85AF}"/>
               </a:ext>
             </a:extLst>
           </p:cNvPr>
@@ -5668,7 +5669,7 @@
           <p:cNvPr id="18" name="직사각형 17">
             <a:extLst>
               <a:ext uri="{FF2B5EF4-FFF2-40B4-BE49-F238E27FC236}">
-                <a16:creationId xmlns:a16="http://schemas.microsoft.com/office/drawing/2014/main" id="{FC56DBEE-CFA2-427D-A54E-C69EBB5FAD8F}"/>
+                <a16:creationId xmlns:a16="http://schemas.microsoft.com/office/drawing/2014/main" xmlns="" id="{FC56DBEE-CFA2-427D-A54E-C69EBB5FAD8F}"/>
               </a:ext>
             </a:extLst>
           </p:cNvPr>
@@ -5722,7 +5723,7 @@
           <p:cNvPr id="6" name="그룹 5">
             <a:extLst>
               <a:ext uri="{FF2B5EF4-FFF2-40B4-BE49-F238E27FC236}">
-                <a16:creationId xmlns:a16="http://schemas.microsoft.com/office/drawing/2014/main" id="{A87738A6-DCCB-44F8-BC8F-5630746B8082}"/>
+                <a16:creationId xmlns:a16="http://schemas.microsoft.com/office/drawing/2014/main" xmlns="" id="{A87738A6-DCCB-44F8-BC8F-5630746B8082}"/>
               </a:ext>
             </a:extLst>
           </p:cNvPr>
@@ -5742,7 +5743,7 @@
             <p:cNvPr id="3" name="TextBox 2">
               <a:extLst>
                 <a:ext uri="{FF2B5EF4-FFF2-40B4-BE49-F238E27FC236}">
-                  <a16:creationId xmlns:a16="http://schemas.microsoft.com/office/drawing/2014/main" id="{3F15D2F0-3EF3-4014-88BD-F1E9CEE28153}"/>
+                  <a16:creationId xmlns:a16="http://schemas.microsoft.com/office/drawing/2014/main" xmlns="" id="{3F15D2F0-3EF3-4014-88BD-F1E9CEE28153}"/>
                 </a:ext>
               </a:extLst>
             </p:cNvPr>
@@ -5790,7 +5791,7 @@
             <p:cNvPr id="4" name="TextBox 3">
               <a:extLst>
                 <a:ext uri="{FF2B5EF4-FFF2-40B4-BE49-F238E27FC236}">
-                  <a16:creationId xmlns:a16="http://schemas.microsoft.com/office/drawing/2014/main" id="{EE9EE9DD-4219-4C6F-BCF5-B48D9535E62E}"/>
+                  <a16:creationId xmlns:a16="http://schemas.microsoft.com/office/drawing/2014/main" xmlns="" id="{EE9EE9DD-4219-4C6F-BCF5-B48D9535E62E}"/>
                 </a:ext>
               </a:extLst>
             </p:cNvPr>
@@ -5860,7 +5861,7 @@
           <p:cNvPr id="9" name="직사각형 8">
             <a:extLst>
               <a:ext uri="{FF2B5EF4-FFF2-40B4-BE49-F238E27FC236}">
-                <a16:creationId xmlns:a16="http://schemas.microsoft.com/office/drawing/2014/main" id="{B946531F-0ED7-40C3-B576-4F56E0B23959}"/>
+                <a16:creationId xmlns:a16="http://schemas.microsoft.com/office/drawing/2014/main" xmlns="" id="{B946531F-0ED7-40C3-B576-4F56E0B23959}"/>
               </a:ext>
             </a:extLst>
           </p:cNvPr>
@@ -5914,7 +5915,7 @@
           <p:cNvPr id="24" name="직각 삼각형 23">
             <a:extLst>
               <a:ext uri="{FF2B5EF4-FFF2-40B4-BE49-F238E27FC236}">
-                <a16:creationId xmlns:a16="http://schemas.microsoft.com/office/drawing/2014/main" id="{A21687B3-DD91-4897-B11B-1D36E99F5FBD}"/>
+                <a16:creationId xmlns:a16="http://schemas.microsoft.com/office/drawing/2014/main" xmlns="" id="{A21687B3-DD91-4897-B11B-1D36E99F5FBD}"/>
               </a:ext>
             </a:extLst>
           </p:cNvPr>
@@ -5966,7 +5967,7 @@
           <p:cNvPr id="11" name="직사각형 10">
             <a:extLst>
               <a:ext uri="{FF2B5EF4-FFF2-40B4-BE49-F238E27FC236}">
-                <a16:creationId xmlns:a16="http://schemas.microsoft.com/office/drawing/2014/main" id="{7BB487F8-F61C-4893-AC9E-6AFB71E51C65}"/>
+                <a16:creationId xmlns:a16="http://schemas.microsoft.com/office/drawing/2014/main" xmlns="" id="{7BB487F8-F61C-4893-AC9E-6AFB71E51C65}"/>
               </a:ext>
             </a:extLst>
           </p:cNvPr>
@@ -6034,7 +6035,7 @@
           <p:cNvPr id="12" name="직사각형 11">
             <a:extLst>
               <a:ext uri="{FF2B5EF4-FFF2-40B4-BE49-F238E27FC236}">
-                <a16:creationId xmlns:a16="http://schemas.microsoft.com/office/drawing/2014/main" id="{68E8765E-D111-4232-97A1-075C2C919EED}"/>
+                <a16:creationId xmlns:a16="http://schemas.microsoft.com/office/drawing/2014/main" xmlns="" id="{68E8765E-D111-4232-97A1-075C2C919EED}"/>
               </a:ext>
             </a:extLst>
           </p:cNvPr>
@@ -6273,7 +6274,7 @@
           <p:cNvPr id="18" name="직사각형 17">
             <a:extLst>
               <a:ext uri="{FF2B5EF4-FFF2-40B4-BE49-F238E27FC236}">
-                <a16:creationId xmlns:a16="http://schemas.microsoft.com/office/drawing/2014/main" id="{FC56DBEE-CFA2-427D-A54E-C69EBB5FAD8F}"/>
+                <a16:creationId xmlns:a16="http://schemas.microsoft.com/office/drawing/2014/main" xmlns="" id="{FC56DBEE-CFA2-427D-A54E-C69EBB5FAD8F}"/>
               </a:ext>
             </a:extLst>
           </p:cNvPr>
@@ -6327,7 +6328,7 @@
           <p:cNvPr id="6" name="그룹 5">
             <a:extLst>
               <a:ext uri="{FF2B5EF4-FFF2-40B4-BE49-F238E27FC236}">
-                <a16:creationId xmlns:a16="http://schemas.microsoft.com/office/drawing/2014/main" id="{A87738A6-DCCB-44F8-BC8F-5630746B8082}"/>
+                <a16:creationId xmlns:a16="http://schemas.microsoft.com/office/drawing/2014/main" xmlns="" id="{A87738A6-DCCB-44F8-BC8F-5630746B8082}"/>
               </a:ext>
             </a:extLst>
           </p:cNvPr>
@@ -6347,7 +6348,7 @@
             <p:cNvPr id="3" name="TextBox 2">
               <a:extLst>
                 <a:ext uri="{FF2B5EF4-FFF2-40B4-BE49-F238E27FC236}">
-                  <a16:creationId xmlns:a16="http://schemas.microsoft.com/office/drawing/2014/main" id="{3F15D2F0-3EF3-4014-88BD-F1E9CEE28153}"/>
+                  <a16:creationId xmlns:a16="http://schemas.microsoft.com/office/drawing/2014/main" xmlns="" id="{3F15D2F0-3EF3-4014-88BD-F1E9CEE28153}"/>
                 </a:ext>
               </a:extLst>
             </p:cNvPr>
@@ -6395,7 +6396,7 @@
             <p:cNvPr id="4" name="TextBox 3">
               <a:extLst>
                 <a:ext uri="{FF2B5EF4-FFF2-40B4-BE49-F238E27FC236}">
-                  <a16:creationId xmlns:a16="http://schemas.microsoft.com/office/drawing/2014/main" id="{EE9EE9DD-4219-4C6F-BCF5-B48D9535E62E}"/>
+                  <a16:creationId xmlns:a16="http://schemas.microsoft.com/office/drawing/2014/main" xmlns="" id="{EE9EE9DD-4219-4C6F-BCF5-B48D9535E62E}"/>
                 </a:ext>
               </a:extLst>
             </p:cNvPr>
@@ -6465,7 +6466,7 @@
           <p:cNvPr id="9" name="직사각형 8">
             <a:extLst>
               <a:ext uri="{FF2B5EF4-FFF2-40B4-BE49-F238E27FC236}">
-                <a16:creationId xmlns:a16="http://schemas.microsoft.com/office/drawing/2014/main" id="{B946531F-0ED7-40C3-B576-4F56E0B23959}"/>
+                <a16:creationId xmlns:a16="http://schemas.microsoft.com/office/drawing/2014/main" xmlns="" id="{B946531F-0ED7-40C3-B576-4F56E0B23959}"/>
               </a:ext>
             </a:extLst>
           </p:cNvPr>
@@ -6519,7 +6520,7 @@
           <p:cNvPr id="24" name="직각 삼각형 23">
             <a:extLst>
               <a:ext uri="{FF2B5EF4-FFF2-40B4-BE49-F238E27FC236}">
-                <a16:creationId xmlns:a16="http://schemas.microsoft.com/office/drawing/2014/main" id="{A21687B3-DD91-4897-B11B-1D36E99F5FBD}"/>
+                <a16:creationId xmlns:a16="http://schemas.microsoft.com/office/drawing/2014/main" xmlns="" id="{A21687B3-DD91-4897-B11B-1D36E99F5FBD}"/>
               </a:ext>
             </a:extLst>
           </p:cNvPr>
@@ -6571,7 +6572,7 @@
           <p:cNvPr id="2050" name="Picture 2" descr="mayaì ëí ì´ë¯¸ì§ ê²ìê²°ê³¼">
             <a:extLst>
               <a:ext uri="{FF2B5EF4-FFF2-40B4-BE49-F238E27FC236}">
-                <a16:creationId xmlns:a16="http://schemas.microsoft.com/office/drawing/2014/main" id="{D6E339B7-DB0E-40E9-843F-CEF3F452B820}"/>
+                <a16:creationId xmlns:a16="http://schemas.microsoft.com/office/drawing/2014/main" xmlns="" id="{D6E339B7-DB0E-40E9-843F-CEF3F452B820}"/>
               </a:ext>
             </a:extLst>
           </p:cNvPr>
@@ -6618,7 +6619,7 @@
           <p:cNvPr id="2052" name="Picture 4" descr="openglì ëí ì´ë¯¸ì§ ê²ìê²°ê³¼">
             <a:extLst>
               <a:ext uri="{FF2B5EF4-FFF2-40B4-BE49-F238E27FC236}">
-                <a16:creationId xmlns:a16="http://schemas.microsoft.com/office/drawing/2014/main" id="{6F5F2ED8-B593-4462-857A-DBCA9C05FE45}"/>
+                <a16:creationId xmlns:a16="http://schemas.microsoft.com/office/drawing/2014/main" xmlns="" id="{6F5F2ED8-B593-4462-857A-DBCA9C05FE45}"/>
               </a:ext>
             </a:extLst>
           </p:cNvPr>
@@ -6665,7 +6666,7 @@
           <p:cNvPr id="11" name="직사각형 10">
             <a:extLst>
               <a:ext uri="{FF2B5EF4-FFF2-40B4-BE49-F238E27FC236}">
-                <a16:creationId xmlns:a16="http://schemas.microsoft.com/office/drawing/2014/main" id="{7BB487F8-F61C-4893-AC9E-6AFB71E51C65}"/>
+                <a16:creationId xmlns:a16="http://schemas.microsoft.com/office/drawing/2014/main" xmlns="" id="{7BB487F8-F61C-4893-AC9E-6AFB71E51C65}"/>
               </a:ext>
             </a:extLst>
           </p:cNvPr>
@@ -6773,7 +6774,7 @@
           <p:cNvPr id="12" name="직사각형 11">
             <a:extLst>
               <a:ext uri="{FF2B5EF4-FFF2-40B4-BE49-F238E27FC236}">
-                <a16:creationId xmlns:a16="http://schemas.microsoft.com/office/drawing/2014/main" id="{68E8765E-D111-4232-97A1-075C2C919EED}"/>
+                <a16:creationId xmlns:a16="http://schemas.microsoft.com/office/drawing/2014/main" xmlns="" id="{68E8765E-D111-4232-97A1-075C2C919EED}"/>
               </a:ext>
             </a:extLst>
           </p:cNvPr>
@@ -6931,7 +6932,7 @@
           <p:cNvPr id="18" name="직사각형 17">
             <a:extLst>
               <a:ext uri="{FF2B5EF4-FFF2-40B4-BE49-F238E27FC236}">
-                <a16:creationId xmlns:a16="http://schemas.microsoft.com/office/drawing/2014/main" id="{FC56DBEE-CFA2-427D-A54E-C69EBB5FAD8F}"/>
+                <a16:creationId xmlns:a16="http://schemas.microsoft.com/office/drawing/2014/main" xmlns="" id="{FC56DBEE-CFA2-427D-A54E-C69EBB5FAD8F}"/>
               </a:ext>
             </a:extLst>
           </p:cNvPr>
@@ -6985,7 +6986,7 @@
           <p:cNvPr id="6" name="그룹 5">
             <a:extLst>
               <a:ext uri="{FF2B5EF4-FFF2-40B4-BE49-F238E27FC236}">
-                <a16:creationId xmlns:a16="http://schemas.microsoft.com/office/drawing/2014/main" id="{A87738A6-DCCB-44F8-BC8F-5630746B8082}"/>
+                <a16:creationId xmlns:a16="http://schemas.microsoft.com/office/drawing/2014/main" xmlns="" id="{A87738A6-DCCB-44F8-BC8F-5630746B8082}"/>
               </a:ext>
             </a:extLst>
           </p:cNvPr>
@@ -7005,7 +7006,7 @@
             <p:cNvPr id="3" name="TextBox 2">
               <a:extLst>
                 <a:ext uri="{FF2B5EF4-FFF2-40B4-BE49-F238E27FC236}">
-                  <a16:creationId xmlns:a16="http://schemas.microsoft.com/office/drawing/2014/main" id="{3F15D2F0-3EF3-4014-88BD-F1E9CEE28153}"/>
+                  <a16:creationId xmlns:a16="http://schemas.microsoft.com/office/drawing/2014/main" xmlns="" id="{3F15D2F0-3EF3-4014-88BD-F1E9CEE28153}"/>
                 </a:ext>
               </a:extLst>
             </p:cNvPr>
@@ -7053,7 +7054,7 @@
             <p:cNvPr id="4" name="TextBox 3">
               <a:extLst>
                 <a:ext uri="{FF2B5EF4-FFF2-40B4-BE49-F238E27FC236}">
-                  <a16:creationId xmlns:a16="http://schemas.microsoft.com/office/drawing/2014/main" id="{EE9EE9DD-4219-4C6F-BCF5-B48D9535E62E}"/>
+                  <a16:creationId xmlns:a16="http://schemas.microsoft.com/office/drawing/2014/main" xmlns="" id="{EE9EE9DD-4219-4C6F-BCF5-B48D9535E62E}"/>
                 </a:ext>
               </a:extLst>
             </p:cNvPr>
@@ -7123,7 +7124,7 @@
           <p:cNvPr id="9" name="직사각형 8">
             <a:extLst>
               <a:ext uri="{FF2B5EF4-FFF2-40B4-BE49-F238E27FC236}">
-                <a16:creationId xmlns:a16="http://schemas.microsoft.com/office/drawing/2014/main" id="{B946531F-0ED7-40C3-B576-4F56E0B23959}"/>
+                <a16:creationId xmlns:a16="http://schemas.microsoft.com/office/drawing/2014/main" xmlns="" id="{B946531F-0ED7-40C3-B576-4F56E0B23959}"/>
               </a:ext>
             </a:extLst>
           </p:cNvPr>
@@ -7177,7 +7178,7 @@
           <p:cNvPr id="24" name="직각 삼각형 23">
             <a:extLst>
               <a:ext uri="{FF2B5EF4-FFF2-40B4-BE49-F238E27FC236}">
-                <a16:creationId xmlns:a16="http://schemas.microsoft.com/office/drawing/2014/main" id="{A21687B3-DD91-4897-B11B-1D36E99F5FBD}"/>
+                <a16:creationId xmlns:a16="http://schemas.microsoft.com/office/drawing/2014/main" xmlns="" id="{A21687B3-DD91-4897-B11B-1D36E99F5FBD}"/>
               </a:ext>
             </a:extLst>
           </p:cNvPr>
@@ -7229,7 +7230,7 @@
           <p:cNvPr id="11" name="직사각형 10">
             <a:extLst>
               <a:ext uri="{FF2B5EF4-FFF2-40B4-BE49-F238E27FC236}">
-                <a16:creationId xmlns:a16="http://schemas.microsoft.com/office/drawing/2014/main" id="{7BB487F8-F61C-4893-AC9E-6AFB71E51C65}"/>
+                <a16:creationId xmlns:a16="http://schemas.microsoft.com/office/drawing/2014/main" xmlns="" id="{7BB487F8-F61C-4893-AC9E-6AFB71E51C65}"/>
               </a:ext>
             </a:extLst>
           </p:cNvPr>
@@ -7320,7 +7321,7 @@
           <p:cNvPr id="12" name="직사각형 11">
             <a:extLst>
               <a:ext uri="{FF2B5EF4-FFF2-40B4-BE49-F238E27FC236}">
-                <a16:creationId xmlns:a16="http://schemas.microsoft.com/office/drawing/2014/main" id="{68E8765E-D111-4232-97A1-075C2C919EED}"/>
+                <a16:creationId xmlns:a16="http://schemas.microsoft.com/office/drawing/2014/main" xmlns="" id="{68E8765E-D111-4232-97A1-075C2C919EED}"/>
               </a:ext>
             </a:extLst>
           </p:cNvPr>
@@ -7887,7 +7888,7 @@
           <p:cNvPr id="18" name="직사각형 17">
             <a:extLst>
               <a:ext uri="{FF2B5EF4-FFF2-40B4-BE49-F238E27FC236}">
-                <a16:creationId xmlns:a16="http://schemas.microsoft.com/office/drawing/2014/main" id="{FC56DBEE-CFA2-427D-A54E-C69EBB5FAD8F}"/>
+                <a16:creationId xmlns:a16="http://schemas.microsoft.com/office/drawing/2014/main" xmlns="" id="{FC56DBEE-CFA2-427D-A54E-C69EBB5FAD8F}"/>
               </a:ext>
             </a:extLst>
           </p:cNvPr>
@@ -7941,7 +7942,7 @@
           <p:cNvPr id="6" name="그룹 5">
             <a:extLst>
               <a:ext uri="{FF2B5EF4-FFF2-40B4-BE49-F238E27FC236}">
-                <a16:creationId xmlns:a16="http://schemas.microsoft.com/office/drawing/2014/main" id="{A87738A6-DCCB-44F8-BC8F-5630746B8082}"/>
+                <a16:creationId xmlns:a16="http://schemas.microsoft.com/office/drawing/2014/main" xmlns="" id="{A87738A6-DCCB-44F8-BC8F-5630746B8082}"/>
               </a:ext>
             </a:extLst>
           </p:cNvPr>
@@ -7961,7 +7962,7 @@
             <p:cNvPr id="3" name="TextBox 2">
               <a:extLst>
                 <a:ext uri="{FF2B5EF4-FFF2-40B4-BE49-F238E27FC236}">
-                  <a16:creationId xmlns:a16="http://schemas.microsoft.com/office/drawing/2014/main" id="{3F15D2F0-3EF3-4014-88BD-F1E9CEE28153}"/>
+                  <a16:creationId xmlns:a16="http://schemas.microsoft.com/office/drawing/2014/main" xmlns="" id="{3F15D2F0-3EF3-4014-88BD-F1E9CEE28153}"/>
                 </a:ext>
               </a:extLst>
             </p:cNvPr>
@@ -8009,7 +8010,7 @@
             <p:cNvPr id="4" name="TextBox 3">
               <a:extLst>
                 <a:ext uri="{FF2B5EF4-FFF2-40B4-BE49-F238E27FC236}">
-                  <a16:creationId xmlns:a16="http://schemas.microsoft.com/office/drawing/2014/main" id="{EE9EE9DD-4219-4C6F-BCF5-B48D9535E62E}"/>
+                  <a16:creationId xmlns:a16="http://schemas.microsoft.com/office/drawing/2014/main" xmlns="" id="{EE9EE9DD-4219-4C6F-BCF5-B48D9535E62E}"/>
                 </a:ext>
               </a:extLst>
             </p:cNvPr>
@@ -8079,7 +8080,7 @@
           <p:cNvPr id="9" name="직사각형 8">
             <a:extLst>
               <a:ext uri="{FF2B5EF4-FFF2-40B4-BE49-F238E27FC236}">
-                <a16:creationId xmlns:a16="http://schemas.microsoft.com/office/drawing/2014/main" id="{B946531F-0ED7-40C3-B576-4F56E0B23959}"/>
+                <a16:creationId xmlns:a16="http://schemas.microsoft.com/office/drawing/2014/main" xmlns="" id="{B946531F-0ED7-40C3-B576-4F56E0B23959}"/>
               </a:ext>
             </a:extLst>
           </p:cNvPr>
@@ -8133,7 +8134,7 @@
           <p:cNvPr id="24" name="직각 삼각형 23">
             <a:extLst>
               <a:ext uri="{FF2B5EF4-FFF2-40B4-BE49-F238E27FC236}">
-                <a16:creationId xmlns:a16="http://schemas.microsoft.com/office/drawing/2014/main" id="{A21687B3-DD91-4897-B11B-1D36E99F5FBD}"/>
+                <a16:creationId xmlns:a16="http://schemas.microsoft.com/office/drawing/2014/main" xmlns="" id="{A21687B3-DD91-4897-B11B-1D36E99F5FBD}"/>
               </a:ext>
             </a:extLst>
           </p:cNvPr>
@@ -8185,7 +8186,7 @@
           <p:cNvPr id="11" name="직사각형 10">
             <a:extLst>
               <a:ext uri="{FF2B5EF4-FFF2-40B4-BE49-F238E27FC236}">
-                <a16:creationId xmlns:a16="http://schemas.microsoft.com/office/drawing/2014/main" id="{7BB487F8-F61C-4893-AC9E-6AFB71E51C65}"/>
+                <a16:creationId xmlns:a16="http://schemas.microsoft.com/office/drawing/2014/main" xmlns="" id="{7BB487F8-F61C-4893-AC9E-6AFB71E51C65}"/>
               </a:ext>
             </a:extLst>
           </p:cNvPr>
@@ -8253,7 +8254,7 @@
           <p:cNvPr id="12" name="직사각형 11">
             <a:extLst>
               <a:ext uri="{FF2B5EF4-FFF2-40B4-BE49-F238E27FC236}">
-                <a16:creationId xmlns:a16="http://schemas.microsoft.com/office/drawing/2014/main" id="{68E8765E-D111-4232-97A1-075C2C919EED}"/>
+                <a16:creationId xmlns:a16="http://schemas.microsoft.com/office/drawing/2014/main" xmlns="" id="{68E8765E-D111-4232-97A1-075C2C919EED}"/>
               </a:ext>
             </a:extLst>
           </p:cNvPr>
@@ -8601,7 +8602,7 @@
           <p:cNvPr id="18" name="직사각형 17">
             <a:extLst>
               <a:ext uri="{FF2B5EF4-FFF2-40B4-BE49-F238E27FC236}">
-                <a16:creationId xmlns:a16="http://schemas.microsoft.com/office/drawing/2014/main" id="{FC56DBEE-CFA2-427D-A54E-C69EBB5FAD8F}"/>
+                <a16:creationId xmlns:a16="http://schemas.microsoft.com/office/drawing/2014/main" xmlns="" id="{FC56DBEE-CFA2-427D-A54E-C69EBB5FAD8F}"/>
               </a:ext>
             </a:extLst>
           </p:cNvPr>
@@ -8655,7 +8656,7 @@
           <p:cNvPr id="9" name="직사각형 8">
             <a:extLst>
               <a:ext uri="{FF2B5EF4-FFF2-40B4-BE49-F238E27FC236}">
-                <a16:creationId xmlns:a16="http://schemas.microsoft.com/office/drawing/2014/main" id="{B946531F-0ED7-40C3-B576-4F56E0B23959}"/>
+                <a16:creationId xmlns:a16="http://schemas.microsoft.com/office/drawing/2014/main" xmlns="" id="{B946531F-0ED7-40C3-B576-4F56E0B23959}"/>
               </a:ext>
             </a:extLst>
           </p:cNvPr>
@@ -8709,7 +8710,7 @@
           <p:cNvPr id="24" name="직각 삼각형 23">
             <a:extLst>
               <a:ext uri="{FF2B5EF4-FFF2-40B4-BE49-F238E27FC236}">
-                <a16:creationId xmlns:a16="http://schemas.microsoft.com/office/drawing/2014/main" id="{A21687B3-DD91-4897-B11B-1D36E99F5FBD}"/>
+                <a16:creationId xmlns:a16="http://schemas.microsoft.com/office/drawing/2014/main" xmlns="" id="{A21687B3-DD91-4897-B11B-1D36E99F5FBD}"/>
               </a:ext>
             </a:extLst>
           </p:cNvPr>
@@ -8761,7 +8762,7 @@
           <p:cNvPr id="33" name="TextBox 32">
             <a:extLst>
               <a:ext uri="{FF2B5EF4-FFF2-40B4-BE49-F238E27FC236}">
-                <a16:creationId xmlns:a16="http://schemas.microsoft.com/office/drawing/2014/main" id="{F4880395-F571-43D9-A990-CD35823B1FFD}"/>
+                <a16:creationId xmlns:a16="http://schemas.microsoft.com/office/drawing/2014/main" xmlns="" id="{F4880395-F571-43D9-A990-CD35823B1FFD}"/>
               </a:ext>
             </a:extLst>
           </p:cNvPr>
@@ -8809,7 +8810,7 @@
           <p:cNvPr id="35" name="TextBox 34">
             <a:extLst>
               <a:ext uri="{FF2B5EF4-FFF2-40B4-BE49-F238E27FC236}">
-                <a16:creationId xmlns:a16="http://schemas.microsoft.com/office/drawing/2014/main" id="{11A9825E-0EA8-4648-8E21-6C7AE38EA01A}"/>
+                <a16:creationId xmlns:a16="http://schemas.microsoft.com/office/drawing/2014/main" xmlns="" id="{11A9825E-0EA8-4648-8E21-6C7AE38EA01A}"/>
               </a:ext>
             </a:extLst>
           </p:cNvPr>
@@ -8870,7 +8871,7 @@
           <p:cNvPr id="26" name="직사각형 25">
             <a:extLst>
               <a:ext uri="{FF2B5EF4-FFF2-40B4-BE49-F238E27FC236}">
-                <a16:creationId xmlns:a16="http://schemas.microsoft.com/office/drawing/2014/main" id="{7EBFDBB5-E7A1-4FF4-982A-5B4742D843AA}"/>
+                <a16:creationId xmlns:a16="http://schemas.microsoft.com/office/drawing/2014/main" xmlns="" id="{7EBFDBB5-E7A1-4FF4-982A-5B4742D843AA}"/>
               </a:ext>
             </a:extLst>
           </p:cNvPr>
@@ -8987,10 +8988,579 @@
       </p:grpSpPr>
       <p:sp>
         <p:nvSpPr>
+          <p:cNvPr id="18" name="직사각형 17">
+            <a:extLst>
+              <a:ext uri="{FF2B5EF4-FFF2-40B4-BE49-F238E27FC236}">
+                <a16:creationId xmlns:a16="http://schemas.microsoft.com/office/drawing/2014/main" xmlns="" id="{FC56DBEE-CFA2-427D-A54E-C69EBB5FAD8F}"/>
+              </a:ext>
+            </a:extLst>
+          </p:cNvPr>
+          <p:cNvSpPr/>
+          <p:nvPr/>
+        </p:nvSpPr>
+        <p:spPr>
+          <a:xfrm>
+            <a:off x="0" y="1592924"/>
+            <a:ext cx="12192000" cy="4888470"/>
+          </a:xfrm>
+          <a:prstGeom prst="rect">
+            <a:avLst/>
+          </a:prstGeom>
+          <a:solidFill>
+            <a:srgbClr val="FFCE38">
+              <a:alpha val="13000"/>
+            </a:srgbClr>
+          </a:solidFill>
+          <a:ln>
+            <a:noFill/>
+          </a:ln>
+        </p:spPr>
+        <p:style>
+          <a:lnRef idx="2">
+            <a:schemeClr val="accent1">
+              <a:shade val="50000"/>
+            </a:schemeClr>
+          </a:lnRef>
+          <a:fillRef idx="1">
+            <a:schemeClr val="accent1"/>
+          </a:fillRef>
+          <a:effectRef idx="0">
+            <a:schemeClr val="accent1"/>
+          </a:effectRef>
+          <a:fontRef idx="minor">
+            <a:schemeClr val="lt1"/>
+          </a:fontRef>
+        </p:style>
+        <p:txBody>
+          <a:bodyPr rtlCol="0" anchor="ctr"/>
+          <a:lstStyle/>
+          <a:p>
+            <a:pPr algn="ctr"/>
+            <a:endParaRPr lang="ko-KR" altLang="en-US" dirty="0"/>
+          </a:p>
+        </p:txBody>
+      </p:sp>
+      <p:sp>
+        <p:nvSpPr>
+          <p:cNvPr id="9" name="직사각형 8">
+            <a:extLst>
+              <a:ext uri="{FF2B5EF4-FFF2-40B4-BE49-F238E27FC236}">
+                <a16:creationId xmlns:a16="http://schemas.microsoft.com/office/drawing/2014/main" xmlns="" id="{B946531F-0ED7-40C3-B576-4F56E0B23959}"/>
+              </a:ext>
+            </a:extLst>
+          </p:cNvPr>
+          <p:cNvSpPr/>
+          <p:nvPr/>
+        </p:nvSpPr>
+        <p:spPr>
+          <a:xfrm>
+            <a:off x="0" y="6654800"/>
+            <a:ext cx="12192000" cy="203200"/>
+          </a:xfrm>
+          <a:prstGeom prst="rect">
+            <a:avLst/>
+          </a:prstGeom>
+          <a:solidFill>
+            <a:srgbClr val="FAA818">
+              <a:alpha val="79000"/>
+            </a:srgbClr>
+          </a:solidFill>
+          <a:ln>
+            <a:noFill/>
+          </a:ln>
+        </p:spPr>
+        <p:style>
+          <a:lnRef idx="2">
+            <a:schemeClr val="accent1">
+              <a:shade val="50000"/>
+            </a:schemeClr>
+          </a:lnRef>
+          <a:fillRef idx="1">
+            <a:schemeClr val="accent1"/>
+          </a:fillRef>
+          <a:effectRef idx="0">
+            <a:schemeClr val="accent1"/>
+          </a:effectRef>
+          <a:fontRef idx="minor">
+            <a:schemeClr val="lt1"/>
+          </a:fontRef>
+        </p:style>
+        <p:txBody>
+          <a:bodyPr rtlCol="0" anchor="ctr"/>
+          <a:lstStyle/>
+          <a:p>
+            <a:pPr algn="ctr"/>
+            <a:endParaRPr lang="ko-KR" altLang="en-US"/>
+          </a:p>
+        </p:txBody>
+      </p:sp>
+      <p:sp>
+        <p:nvSpPr>
+          <p:cNvPr id="24" name="직각 삼각형 23">
+            <a:extLst>
+              <a:ext uri="{FF2B5EF4-FFF2-40B4-BE49-F238E27FC236}">
+                <a16:creationId xmlns:a16="http://schemas.microsoft.com/office/drawing/2014/main" xmlns="" id="{A21687B3-DD91-4897-B11B-1D36E99F5FBD}"/>
+              </a:ext>
+            </a:extLst>
+          </p:cNvPr>
+          <p:cNvSpPr/>
+          <p:nvPr/>
+        </p:nvSpPr>
+        <p:spPr>
+          <a:xfrm flipV="1">
+            <a:off x="120228" y="119183"/>
+            <a:ext cx="335280" cy="335280"/>
+          </a:xfrm>
+          <a:prstGeom prst="rtTriangle">
+            <a:avLst/>
+          </a:prstGeom>
+          <a:solidFill>
+            <a:srgbClr val="FFCE38"/>
+          </a:solidFill>
+          <a:ln>
+            <a:noFill/>
+          </a:ln>
+        </p:spPr>
+        <p:style>
+          <a:lnRef idx="2">
+            <a:schemeClr val="accent1">
+              <a:shade val="50000"/>
+            </a:schemeClr>
+          </a:lnRef>
+          <a:fillRef idx="1">
+            <a:schemeClr val="accent1"/>
+          </a:fillRef>
+          <a:effectRef idx="0">
+            <a:schemeClr val="accent1"/>
+          </a:effectRef>
+          <a:fontRef idx="minor">
+            <a:schemeClr val="lt1"/>
+          </a:fontRef>
+        </p:style>
+        <p:txBody>
+          <a:bodyPr rtlCol="0" anchor="ctr"/>
+          <a:lstStyle/>
+          <a:p>
+            <a:pPr algn="ctr"/>
+            <a:endParaRPr lang="ko-KR" altLang="en-US"/>
+          </a:p>
+        </p:txBody>
+      </p:sp>
+      <p:sp>
+        <p:nvSpPr>
+          <p:cNvPr id="33" name="TextBox 32">
+            <a:extLst>
+              <a:ext uri="{FF2B5EF4-FFF2-40B4-BE49-F238E27FC236}">
+                <a16:creationId xmlns:a16="http://schemas.microsoft.com/office/drawing/2014/main" xmlns="" id="{F4880395-F571-43D9-A990-CD35823B1FFD}"/>
+              </a:ext>
+            </a:extLst>
+          </p:cNvPr>
+          <p:cNvSpPr txBox="1"/>
+          <p:nvPr/>
+        </p:nvSpPr>
+        <p:spPr>
+          <a:xfrm>
+            <a:off x="388878" y="279400"/>
+            <a:ext cx="8444225" cy="830997"/>
+          </a:xfrm>
+          <a:prstGeom prst="rect">
+            <a:avLst/>
+          </a:prstGeom>
+          <a:noFill/>
+        </p:spPr>
+        <p:txBody>
+          <a:bodyPr wrap="square" rtlCol="0">
+            <a:spAutoFit/>
+          </a:bodyPr>
+          <a:lstStyle/>
+          <a:p>
+            <a:r>
+              <a:rPr lang="en-US" altLang="ko-KR" sz="4800" spc="-300" dirty="0" smtClean="0">
+                <a:solidFill>
+                  <a:srgbClr val="FAA818"/>
+                </a:solidFill>
+                <a:latin typeface="KoPub돋움체 Medium" panose="00000600000000000000" pitchFamily="2" charset="-127"/>
+                <a:ea typeface="KoPub돋움체 Medium" panose="00000600000000000000" pitchFamily="2" charset="-127"/>
+              </a:rPr>
+              <a:t>Conclusion</a:t>
+            </a:r>
+            <a:endParaRPr lang="ko-KR" altLang="en-US" sz="4800" spc="-300" dirty="0">
+              <a:solidFill>
+                <a:srgbClr val="FAA818"/>
+              </a:solidFill>
+              <a:latin typeface="KoPub돋움체 Medium" panose="00000600000000000000" pitchFamily="2" charset="-127"/>
+              <a:ea typeface="KoPub돋움체 Medium" panose="00000600000000000000" pitchFamily="2" charset="-127"/>
+            </a:endParaRPr>
+          </a:p>
+        </p:txBody>
+      </p:sp>
+      <p:sp>
+        <p:nvSpPr>
+          <p:cNvPr id="26" name="직사각형 25">
+            <a:extLst>
+              <a:ext uri="{FF2B5EF4-FFF2-40B4-BE49-F238E27FC236}">
+                <a16:creationId xmlns:a16="http://schemas.microsoft.com/office/drawing/2014/main" xmlns="" id="{7EBFDBB5-E7A1-4FF4-982A-5B4742D843AA}"/>
+              </a:ext>
+            </a:extLst>
+          </p:cNvPr>
+          <p:cNvSpPr/>
+          <p:nvPr/>
+        </p:nvSpPr>
+        <p:spPr>
+          <a:xfrm>
+            <a:off x="0" y="2359778"/>
+            <a:ext cx="12192000" cy="3354765"/>
+          </a:xfrm>
+          <a:prstGeom prst="rect">
+            <a:avLst/>
+          </a:prstGeom>
+        </p:spPr>
+        <p:txBody>
+          <a:bodyPr wrap="square" anchor="ctr">
+            <a:spAutoFit/>
+          </a:bodyPr>
+          <a:lstStyle/>
+          <a:p>
+            <a:pPr marL="514350" indent="-514350">
+              <a:buAutoNum type="arabicPeriod"/>
+            </a:pPr>
+            <a:r>
+              <a:rPr lang="en-US" altLang="ko-KR" sz="2800" b="1" spc="-150" dirty="0" smtClean="0">
+                <a:ln>
+                  <a:solidFill>
+                    <a:schemeClr val="bg1">
+                      <a:alpha val="30000"/>
+                    </a:schemeClr>
+                  </a:solidFill>
+                </a:ln>
+                <a:solidFill>
+                  <a:schemeClr val="tx1">
+                    <a:lumMod val="95000"/>
+                    <a:lumOff val="5000"/>
+                  </a:schemeClr>
+                </a:solidFill>
+                <a:latin typeface="+mn-ea"/>
+              </a:rPr>
+              <a:t>OpenGL </a:t>
+            </a:r>
+            <a:r>
+              <a:rPr lang="ko-KR" altLang="en-US" sz="2800" b="1" spc="-150" dirty="0" smtClean="0">
+                <a:ln>
+                  <a:solidFill>
+                    <a:schemeClr val="bg1">
+                      <a:alpha val="30000"/>
+                    </a:schemeClr>
+                  </a:solidFill>
+                </a:ln>
+                <a:solidFill>
+                  <a:schemeClr val="tx1">
+                    <a:lumMod val="95000"/>
+                    <a:lumOff val="5000"/>
+                  </a:schemeClr>
+                </a:solidFill>
+                <a:latin typeface="+mn-ea"/>
+              </a:rPr>
+              <a:t>을 사용했기 때문에 어플이나 웹분야에서 다양하게 구현할 수 있다</a:t>
+            </a:r>
+            <a:r>
+              <a:rPr lang="en-US" altLang="ko-KR" sz="2800" b="1" spc="-150" dirty="0" smtClean="0">
+                <a:ln>
+                  <a:solidFill>
+                    <a:schemeClr val="bg1">
+                      <a:alpha val="30000"/>
+                    </a:schemeClr>
+                  </a:solidFill>
+                </a:ln>
+                <a:solidFill>
+                  <a:schemeClr val="tx1">
+                    <a:lumMod val="95000"/>
+                    <a:lumOff val="5000"/>
+                  </a:schemeClr>
+                </a:solidFill>
+                <a:latin typeface="+mn-ea"/>
+              </a:rPr>
+              <a:t>.</a:t>
+            </a:r>
+          </a:p>
+          <a:p>
+            <a:pPr marL="514350" indent="-514350">
+              <a:buAutoNum type="arabicPeriod"/>
+            </a:pPr>
+            <a:endParaRPr lang="en-US" altLang="ko-KR" sz="2800" b="1" spc="-150" dirty="0" smtClean="0">
+              <a:ln>
+                <a:solidFill>
+                  <a:schemeClr val="bg1">
+                    <a:alpha val="30000"/>
+                  </a:schemeClr>
+                </a:solidFill>
+              </a:ln>
+              <a:solidFill>
+                <a:schemeClr val="tx1">
+                  <a:lumMod val="95000"/>
+                  <a:lumOff val="5000"/>
+                </a:schemeClr>
+              </a:solidFill>
+              <a:latin typeface="+mn-ea"/>
+            </a:endParaRPr>
+          </a:p>
+          <a:p>
+            <a:pPr marL="514350" indent="-514350">
+              <a:buAutoNum type="arabicPeriod"/>
+            </a:pPr>
+            <a:r>
+              <a:rPr lang="ko-KR" altLang="en-US" sz="2800" b="1" spc="-150" dirty="0" smtClean="0">
+                <a:ln>
+                  <a:solidFill>
+                    <a:schemeClr val="bg1">
+                      <a:alpha val="30000"/>
+                    </a:schemeClr>
+                  </a:solidFill>
+                </a:ln>
+                <a:solidFill>
+                  <a:schemeClr val="tx1">
+                    <a:lumMod val="95000"/>
+                    <a:lumOff val="5000"/>
+                  </a:schemeClr>
+                </a:solidFill>
+                <a:latin typeface="+mn-ea"/>
+              </a:rPr>
+              <a:t> </a:t>
+            </a:r>
+            <a:r>
+              <a:rPr lang="en-US" altLang="ko-KR" sz="2800" b="1" spc="-150" dirty="0" smtClean="0">
+                <a:ln>
+                  <a:solidFill>
+                    <a:schemeClr val="bg1">
+                      <a:alpha val="30000"/>
+                    </a:schemeClr>
+                  </a:solidFill>
+                </a:ln>
+                <a:solidFill>
+                  <a:schemeClr val="tx1">
+                    <a:lumMod val="95000"/>
+                    <a:lumOff val="5000"/>
+                  </a:schemeClr>
+                </a:solidFill>
+                <a:latin typeface="+mn-ea"/>
+              </a:rPr>
+              <a:t>CSV</a:t>
+            </a:r>
+            <a:r>
+              <a:rPr lang="ko-KR" altLang="en-US" sz="2800" b="1" spc="-150" dirty="0" smtClean="0">
+                <a:ln>
+                  <a:solidFill>
+                    <a:schemeClr val="bg1">
+                      <a:alpha val="30000"/>
+                    </a:schemeClr>
+                  </a:solidFill>
+                </a:ln>
+                <a:solidFill>
+                  <a:schemeClr val="tx1">
+                    <a:lumMod val="95000"/>
+                    <a:lumOff val="5000"/>
+                  </a:schemeClr>
+                </a:solidFill>
+                <a:latin typeface="+mn-ea"/>
+              </a:rPr>
+              <a:t>파일을 활용해서 데이터를 처리했기 때문에 </a:t>
+            </a:r>
+            <a:r>
+              <a:rPr lang="en-US" altLang="ko-KR" sz="2800" b="1" spc="-150" dirty="0" smtClean="0">
+                <a:ln>
+                  <a:solidFill>
+                    <a:schemeClr val="bg1">
+                      <a:alpha val="30000"/>
+                    </a:schemeClr>
+                  </a:solidFill>
+                </a:ln>
+                <a:solidFill>
+                  <a:schemeClr val="tx1">
+                    <a:lumMod val="95000"/>
+                    <a:lumOff val="5000"/>
+                  </a:schemeClr>
+                </a:solidFill>
+                <a:latin typeface="+mn-ea"/>
+              </a:rPr>
+              <a:t>,</a:t>
+            </a:r>
+            <a:r>
+              <a:rPr lang="ko-KR" altLang="en-US" sz="2800" b="1" spc="-150" dirty="0" smtClean="0">
+                <a:ln>
+                  <a:solidFill>
+                    <a:schemeClr val="bg1">
+                      <a:alpha val="30000"/>
+                    </a:schemeClr>
+                  </a:solidFill>
+                </a:ln>
+                <a:solidFill>
+                  <a:schemeClr val="tx1">
+                    <a:lumMod val="95000"/>
+                    <a:lumOff val="5000"/>
+                  </a:schemeClr>
+                </a:solidFill>
+                <a:latin typeface="+mn-ea"/>
+              </a:rPr>
+              <a:t> 데이터의 변경을 쉽게 처리할 수 있다</a:t>
+            </a:r>
+            <a:r>
+              <a:rPr lang="en-US" altLang="ko-KR" sz="2800" b="1" spc="-150" dirty="0" smtClean="0">
+                <a:ln>
+                  <a:solidFill>
+                    <a:schemeClr val="bg1">
+                      <a:alpha val="30000"/>
+                    </a:schemeClr>
+                  </a:solidFill>
+                </a:ln>
+                <a:solidFill>
+                  <a:schemeClr val="tx1">
+                    <a:lumMod val="95000"/>
+                    <a:lumOff val="5000"/>
+                  </a:schemeClr>
+                </a:solidFill>
+                <a:latin typeface="+mn-ea"/>
+              </a:rPr>
+              <a:t>.</a:t>
+            </a:r>
+          </a:p>
+          <a:p>
+            <a:pPr marL="514350" indent="-514350">
+              <a:buAutoNum type="arabicPeriod"/>
+            </a:pPr>
+            <a:endParaRPr lang="en-US" altLang="ko-KR" sz="2800" b="1" spc="-150" dirty="0" smtClean="0">
+              <a:ln>
+                <a:solidFill>
+                  <a:schemeClr val="bg1">
+                    <a:alpha val="30000"/>
+                  </a:schemeClr>
+                </a:solidFill>
+              </a:ln>
+              <a:solidFill>
+                <a:schemeClr val="tx1">
+                  <a:lumMod val="95000"/>
+                  <a:lumOff val="5000"/>
+                </a:schemeClr>
+              </a:solidFill>
+              <a:latin typeface="+mn-ea"/>
+            </a:endParaRPr>
+          </a:p>
+          <a:p>
+            <a:pPr marL="514350" indent="-514350">
+              <a:buAutoNum type="arabicPeriod"/>
+            </a:pPr>
+            <a:r>
+              <a:rPr lang="ko-KR" altLang="en-US" sz="2800" b="1" spc="-150" dirty="0" smtClean="0">
+                <a:ln>
+                  <a:solidFill>
+                    <a:schemeClr val="bg1">
+                      <a:alpha val="30000"/>
+                    </a:schemeClr>
+                  </a:solidFill>
+                </a:ln>
+                <a:solidFill>
+                  <a:schemeClr val="tx1">
+                    <a:lumMod val="95000"/>
+                    <a:lumOff val="5000"/>
+                  </a:schemeClr>
+                </a:solidFill>
+                <a:latin typeface="+mn-ea"/>
+              </a:rPr>
+              <a:t>피난안내도의 경우 같이 교차점 노드들을 추가 및 제거를 통해서 돌아갈수 있는 경로를 제공할 수 있다</a:t>
+            </a:r>
+            <a:r>
+              <a:rPr lang="en-US" altLang="ko-KR" sz="2800" b="1" spc="-150" dirty="0" smtClean="0">
+                <a:ln>
+                  <a:solidFill>
+                    <a:schemeClr val="bg1">
+                      <a:alpha val="30000"/>
+                    </a:schemeClr>
+                  </a:solidFill>
+                </a:ln>
+                <a:solidFill>
+                  <a:schemeClr val="tx1">
+                    <a:lumMod val="95000"/>
+                    <a:lumOff val="5000"/>
+                  </a:schemeClr>
+                </a:solidFill>
+                <a:latin typeface="+mn-ea"/>
+              </a:rPr>
+              <a:t>.</a:t>
+            </a:r>
+            <a:endParaRPr lang="en-US" altLang="ko-KR" sz="2800" b="1" spc="-150" dirty="0">
+              <a:ln>
+                <a:solidFill>
+                  <a:schemeClr val="bg1">
+                    <a:alpha val="30000"/>
+                  </a:schemeClr>
+                </a:solidFill>
+              </a:ln>
+              <a:solidFill>
+                <a:schemeClr val="tx1">
+                  <a:lumMod val="95000"/>
+                  <a:lumOff val="5000"/>
+                </a:schemeClr>
+              </a:solidFill>
+              <a:latin typeface="+mn-ea"/>
+            </a:endParaRPr>
+          </a:p>
+          <a:p>
+            <a:r>
+              <a:rPr lang="en-US" altLang="ko-KR" sz="1600" b="1" spc="-150" dirty="0">
+                <a:ln>
+                  <a:solidFill>
+                    <a:schemeClr val="bg1">
+                      <a:alpha val="30000"/>
+                    </a:schemeClr>
+                  </a:solidFill>
+                </a:ln>
+                <a:solidFill>
+                  <a:schemeClr val="tx1">
+                    <a:lumMod val="95000"/>
+                    <a:lumOff val="5000"/>
+                  </a:schemeClr>
+                </a:solidFill>
+                <a:latin typeface="+mn-ea"/>
+              </a:rPr>
+              <a:t>      </a:t>
+            </a:r>
+          </a:p>
+        </p:txBody>
+      </p:sp>
+    </p:spTree>
+    <p:extLst>
+      <p:ext uri="{BB962C8B-B14F-4D97-AF65-F5344CB8AC3E}">
+        <p14:creationId xmlns:p14="http://schemas.microsoft.com/office/powerpoint/2010/main" val="867996484"/>
+      </p:ext>
+    </p:extLst>
+  </p:cSld>
+  <p:clrMapOvr>
+    <a:masterClrMapping/>
+  </p:clrMapOvr>
+</p:sld>
+</file>
+
+<file path=ppt/slides/slide19.xml><?xml version="1.0" encoding="utf-8"?>
+<p:sld xmlns:a="http://schemas.openxmlformats.org/drawingml/2006/main" xmlns:r="http://schemas.openxmlformats.org/officeDocument/2006/relationships" xmlns:p="http://schemas.openxmlformats.org/presentationml/2006/main">
+  <p:cSld>
+    <p:spTree>
+      <p:nvGrpSpPr>
+        <p:cNvPr id="1" name=""/>
+        <p:cNvGrpSpPr/>
+        <p:nvPr/>
+      </p:nvGrpSpPr>
+      <p:grpSpPr>
+        <a:xfrm>
+          <a:off x="0" y="0"/>
+          <a:ext cx="0" cy="0"/>
+          <a:chOff x="0" y="0"/>
+          <a:chExt cx="0" cy="0"/>
+        </a:xfrm>
+      </p:grpSpPr>
+      <p:sp>
+        <p:nvSpPr>
           <p:cNvPr id="5" name="직사각형 4">
             <a:extLst>
               <a:ext uri="{FF2B5EF4-FFF2-40B4-BE49-F238E27FC236}">
-                <a16:creationId xmlns:a16="http://schemas.microsoft.com/office/drawing/2014/main" id="{9447557F-5328-4686-AF79-A3671F6E3A90}"/>
+                <a16:creationId xmlns:a16="http://schemas.microsoft.com/office/drawing/2014/main" xmlns="" id="{9447557F-5328-4686-AF79-A3671F6E3A90}"/>
               </a:ext>
             </a:extLst>
           </p:cNvPr>
@@ -9046,7 +9616,7 @@
           <p:cNvPr id="3" name="TextBox 2">
             <a:extLst>
               <a:ext uri="{FF2B5EF4-FFF2-40B4-BE49-F238E27FC236}">
-                <a16:creationId xmlns:a16="http://schemas.microsoft.com/office/drawing/2014/main" id="{C1457E5F-B183-42E6-930C-F934AA0FDB9D}"/>
+                <a16:creationId xmlns:a16="http://schemas.microsoft.com/office/drawing/2014/main" xmlns="" id="{C1457E5F-B183-42E6-930C-F934AA0FDB9D}"/>
               </a:ext>
             </a:extLst>
           </p:cNvPr>
@@ -9098,7 +9668,7 @@
           <p:cNvPr id="8" name="TextBox 7">
             <a:extLst>
               <a:ext uri="{FF2B5EF4-FFF2-40B4-BE49-F238E27FC236}">
-                <a16:creationId xmlns:a16="http://schemas.microsoft.com/office/drawing/2014/main" id="{C4E81C81-5024-48BC-8389-B3C4BEF828E6}"/>
+                <a16:creationId xmlns:a16="http://schemas.microsoft.com/office/drawing/2014/main" xmlns="" id="{C4E81C81-5024-48BC-8389-B3C4BEF828E6}"/>
               </a:ext>
             </a:extLst>
           </p:cNvPr>
@@ -9150,7 +9720,7 @@
           <p:cNvPr id="11" name="TextBox 10">
             <a:extLst>
               <a:ext uri="{FF2B5EF4-FFF2-40B4-BE49-F238E27FC236}">
-                <a16:creationId xmlns:a16="http://schemas.microsoft.com/office/drawing/2014/main" id="{C98783DD-E82C-4977-B139-6DFAA5A21F5B}"/>
+                <a16:creationId xmlns:a16="http://schemas.microsoft.com/office/drawing/2014/main" xmlns="" id="{C98783DD-E82C-4977-B139-6DFAA5A21F5B}"/>
               </a:ext>
             </a:extLst>
           </p:cNvPr>
@@ -9228,7 +9798,7 @@
               <p14:cNvPr id="12" name="잉크 11">
                 <a:extLst>
                   <a:ext uri="{FF2B5EF4-FFF2-40B4-BE49-F238E27FC236}">
-                    <a16:creationId xmlns:a16="http://schemas.microsoft.com/office/drawing/2014/main" id="{DBC48598-4927-42D1-862C-3E9D51F6B6FC}"/>
+                    <a16:creationId xmlns:a16="http://schemas.microsoft.com/office/drawing/2014/main" xmlns="" id="{DBC48598-4927-42D1-862C-3E9D51F6B6FC}"/>
                   </a:ext>
                 </a:extLst>
               </p14:cNvPr>
@@ -9307,7 +9877,7 @@
           <p:cNvPr id="26" name="사각형: 둥근 모서리 25">
             <a:extLst>
               <a:ext uri="{FF2B5EF4-FFF2-40B4-BE49-F238E27FC236}">
-                <a16:creationId xmlns:a16="http://schemas.microsoft.com/office/drawing/2014/main" id="{6EF4AACF-BF98-4D1B-815E-F2B21068B69C}"/>
+                <a16:creationId xmlns:a16="http://schemas.microsoft.com/office/drawing/2014/main" xmlns="" id="{6EF4AACF-BF98-4D1B-815E-F2B21068B69C}"/>
               </a:ext>
             </a:extLst>
           </p:cNvPr>
@@ -9371,7 +9941,7 @@
           <p:cNvPr id="25" name="사각형: 둥근 모서리 24">
             <a:extLst>
               <a:ext uri="{FF2B5EF4-FFF2-40B4-BE49-F238E27FC236}">
-                <a16:creationId xmlns:a16="http://schemas.microsoft.com/office/drawing/2014/main" id="{2B540C0C-C67A-4CCA-936F-6F1BF9B33AA6}"/>
+                <a16:creationId xmlns:a16="http://schemas.microsoft.com/office/drawing/2014/main" xmlns="" id="{2B540C0C-C67A-4CCA-936F-6F1BF9B33AA6}"/>
               </a:ext>
             </a:extLst>
           </p:cNvPr>
@@ -9435,7 +10005,7 @@
           <p:cNvPr id="11" name="TextBox 10">
             <a:extLst>
               <a:ext uri="{FF2B5EF4-FFF2-40B4-BE49-F238E27FC236}">
-                <a16:creationId xmlns:a16="http://schemas.microsoft.com/office/drawing/2014/main" id="{5F5C2694-2958-48AC-A495-3A4D740A8E48}"/>
+                <a16:creationId xmlns:a16="http://schemas.microsoft.com/office/drawing/2014/main" xmlns="" id="{5F5C2694-2958-48AC-A495-3A4D740A8E48}"/>
               </a:ext>
             </a:extLst>
           </p:cNvPr>
@@ -9479,7 +10049,7 @@
           <p:cNvPr id="27" name="직사각형 26">
             <a:extLst>
               <a:ext uri="{FF2B5EF4-FFF2-40B4-BE49-F238E27FC236}">
-                <a16:creationId xmlns:a16="http://schemas.microsoft.com/office/drawing/2014/main" id="{7B485AC3-93BA-4C5D-BD3E-4C24FE11A689}"/>
+                <a16:creationId xmlns:a16="http://schemas.microsoft.com/office/drawing/2014/main" xmlns="" id="{7B485AC3-93BA-4C5D-BD3E-4C24FE11A689}"/>
               </a:ext>
             </a:extLst>
           </p:cNvPr>
@@ -9535,7 +10105,7 @@
           <p:cNvPr id="9" name="사각형: 둥근 모서리 25">
             <a:extLst>
               <a:ext uri="{FF2B5EF4-FFF2-40B4-BE49-F238E27FC236}">
-                <a16:creationId xmlns:a16="http://schemas.microsoft.com/office/drawing/2014/main" id="{6EF4AACF-BF98-4D1B-815E-F2B21068B69C}"/>
+                <a16:creationId xmlns:a16="http://schemas.microsoft.com/office/drawing/2014/main" xmlns="" id="{6EF4AACF-BF98-4D1B-815E-F2B21068B69C}"/>
               </a:ext>
             </a:extLst>
           </p:cNvPr>
@@ -9599,7 +10169,7 @@
           <p:cNvPr id="10" name="TextBox 9">
             <a:extLst>
               <a:ext uri="{FF2B5EF4-FFF2-40B4-BE49-F238E27FC236}">
-                <a16:creationId xmlns:a16="http://schemas.microsoft.com/office/drawing/2014/main" id="{AFFF3868-DADC-439E-953C-BAD4581A3B8A}"/>
+                <a16:creationId xmlns:a16="http://schemas.microsoft.com/office/drawing/2014/main" xmlns="" id="{AFFF3868-DADC-439E-953C-BAD4581A3B8A}"/>
               </a:ext>
             </a:extLst>
           </p:cNvPr>
@@ -9725,7 +10295,7 @@
           <p:cNvPr id="15" name="TextBox 14">
             <a:extLst>
               <a:ext uri="{FF2B5EF4-FFF2-40B4-BE49-F238E27FC236}">
-                <a16:creationId xmlns:a16="http://schemas.microsoft.com/office/drawing/2014/main" id="{AFFF3868-DADC-439E-953C-BAD4581A3B8A}"/>
+                <a16:creationId xmlns:a16="http://schemas.microsoft.com/office/drawing/2014/main" xmlns="" id="{AFFF3868-DADC-439E-953C-BAD4581A3B8A}"/>
               </a:ext>
             </a:extLst>
           </p:cNvPr>
@@ -9860,7 +10430,7 @@
           <p:cNvPr id="4" name="직사각형 3">
             <a:extLst>
               <a:ext uri="{FF2B5EF4-FFF2-40B4-BE49-F238E27FC236}">
-                <a16:creationId xmlns:a16="http://schemas.microsoft.com/office/drawing/2014/main" id="{FC56DBEE-CFA2-427D-A54E-C69EBB5FAD8F}"/>
+                <a16:creationId xmlns:a16="http://schemas.microsoft.com/office/drawing/2014/main" xmlns="" id="{FC56DBEE-CFA2-427D-A54E-C69EBB5FAD8F}"/>
               </a:ext>
             </a:extLst>
           </p:cNvPr>
@@ -9914,7 +10484,7 @@
           <p:cNvPr id="5" name="직사각형 4">
             <a:extLst>
               <a:ext uri="{FF2B5EF4-FFF2-40B4-BE49-F238E27FC236}">
-                <a16:creationId xmlns:a16="http://schemas.microsoft.com/office/drawing/2014/main" id="{B946531F-0ED7-40C3-B576-4F56E0B23959}"/>
+                <a16:creationId xmlns:a16="http://schemas.microsoft.com/office/drawing/2014/main" xmlns="" id="{B946531F-0ED7-40C3-B576-4F56E0B23959}"/>
               </a:ext>
             </a:extLst>
           </p:cNvPr>
@@ -9968,7 +10538,7 @@
           <p:cNvPr id="6" name="그룹 5">
             <a:extLst>
               <a:ext uri="{FF2B5EF4-FFF2-40B4-BE49-F238E27FC236}">
-                <a16:creationId xmlns:a16="http://schemas.microsoft.com/office/drawing/2014/main" id="{A87738A6-DCCB-44F8-BC8F-5630746B8082}"/>
+                <a16:creationId xmlns:a16="http://schemas.microsoft.com/office/drawing/2014/main" xmlns="" id="{A87738A6-DCCB-44F8-BC8F-5630746B8082}"/>
               </a:ext>
             </a:extLst>
           </p:cNvPr>
@@ -9988,7 +10558,7 @@
             <p:cNvPr id="7" name="TextBox 2">
               <a:extLst>
                 <a:ext uri="{FF2B5EF4-FFF2-40B4-BE49-F238E27FC236}">
-                  <a16:creationId xmlns:a16="http://schemas.microsoft.com/office/drawing/2014/main" id="{3F15D2F0-3EF3-4014-88BD-F1E9CEE28153}"/>
+                  <a16:creationId xmlns:a16="http://schemas.microsoft.com/office/drawing/2014/main" xmlns="" id="{3F15D2F0-3EF3-4014-88BD-F1E9CEE28153}"/>
                 </a:ext>
               </a:extLst>
             </p:cNvPr>
@@ -10046,7 +10616,7 @@
             <p:cNvPr id="8" name="TextBox 3">
               <a:extLst>
                 <a:ext uri="{FF2B5EF4-FFF2-40B4-BE49-F238E27FC236}">
-                  <a16:creationId xmlns:a16="http://schemas.microsoft.com/office/drawing/2014/main" id="{EE9EE9DD-4219-4C6F-BCF5-B48D9535E62E}"/>
+                  <a16:creationId xmlns:a16="http://schemas.microsoft.com/office/drawing/2014/main" xmlns="" id="{EE9EE9DD-4219-4C6F-BCF5-B48D9535E62E}"/>
                 </a:ext>
               </a:extLst>
             </p:cNvPr>
@@ -10116,7 +10686,7 @@
           <p:cNvPr id="9" name="직각 삼각형 23">
             <a:extLst>
               <a:ext uri="{FF2B5EF4-FFF2-40B4-BE49-F238E27FC236}">
-                <a16:creationId xmlns:a16="http://schemas.microsoft.com/office/drawing/2014/main" id="{A21687B3-DD91-4897-B11B-1D36E99F5FBD}"/>
+                <a16:creationId xmlns:a16="http://schemas.microsoft.com/office/drawing/2014/main" xmlns="" id="{A21687B3-DD91-4897-B11B-1D36E99F5FBD}"/>
               </a:ext>
             </a:extLst>
           </p:cNvPr>
@@ -10198,7 +10768,7 @@
           <p:cNvPr id="10" name="사각형: 잘린 대각선 방향 모서리 18">
             <a:extLst>
               <a:ext uri="{FF2B5EF4-FFF2-40B4-BE49-F238E27FC236}">
-                <a16:creationId xmlns:a16="http://schemas.microsoft.com/office/drawing/2014/main" id="{AE988215-4041-4A4C-BC8C-DD558303ABAF}"/>
+                <a16:creationId xmlns:a16="http://schemas.microsoft.com/office/drawing/2014/main" xmlns="" id="{AE988215-4041-4A4C-BC8C-DD558303ABAF}"/>
               </a:ext>
             </a:extLst>
           </p:cNvPr>
@@ -10533,7 +11103,7 @@
           <p:cNvPr id="4" name="직사각형 3">
             <a:extLst>
               <a:ext uri="{FF2B5EF4-FFF2-40B4-BE49-F238E27FC236}">
-                <a16:creationId xmlns:a16="http://schemas.microsoft.com/office/drawing/2014/main" id="{FC56DBEE-CFA2-427D-A54E-C69EBB5FAD8F}"/>
+                <a16:creationId xmlns:a16="http://schemas.microsoft.com/office/drawing/2014/main" xmlns="" id="{FC56DBEE-CFA2-427D-A54E-C69EBB5FAD8F}"/>
               </a:ext>
             </a:extLst>
           </p:cNvPr>
@@ -10587,7 +11157,7 @@
           <p:cNvPr id="5" name="직사각형 4">
             <a:extLst>
               <a:ext uri="{FF2B5EF4-FFF2-40B4-BE49-F238E27FC236}">
-                <a16:creationId xmlns:a16="http://schemas.microsoft.com/office/drawing/2014/main" id="{B946531F-0ED7-40C3-B576-4F56E0B23959}"/>
+                <a16:creationId xmlns:a16="http://schemas.microsoft.com/office/drawing/2014/main" xmlns="" id="{B946531F-0ED7-40C3-B576-4F56E0B23959}"/>
               </a:ext>
             </a:extLst>
           </p:cNvPr>
@@ -10641,7 +11211,7 @@
           <p:cNvPr id="6" name="그룹 5">
             <a:extLst>
               <a:ext uri="{FF2B5EF4-FFF2-40B4-BE49-F238E27FC236}">
-                <a16:creationId xmlns:a16="http://schemas.microsoft.com/office/drawing/2014/main" id="{A87738A6-DCCB-44F8-BC8F-5630746B8082}"/>
+                <a16:creationId xmlns:a16="http://schemas.microsoft.com/office/drawing/2014/main" xmlns="" id="{A87738A6-DCCB-44F8-BC8F-5630746B8082}"/>
               </a:ext>
             </a:extLst>
           </p:cNvPr>
@@ -10661,7 +11231,7 @@
             <p:cNvPr id="7" name="TextBox 2">
               <a:extLst>
                 <a:ext uri="{FF2B5EF4-FFF2-40B4-BE49-F238E27FC236}">
-                  <a16:creationId xmlns:a16="http://schemas.microsoft.com/office/drawing/2014/main" id="{3F15D2F0-3EF3-4014-88BD-F1E9CEE28153}"/>
+                  <a16:creationId xmlns:a16="http://schemas.microsoft.com/office/drawing/2014/main" xmlns="" id="{3F15D2F0-3EF3-4014-88BD-F1E9CEE28153}"/>
                 </a:ext>
               </a:extLst>
             </p:cNvPr>
@@ -10719,7 +11289,7 @@
             <p:cNvPr id="8" name="TextBox 3">
               <a:extLst>
                 <a:ext uri="{FF2B5EF4-FFF2-40B4-BE49-F238E27FC236}">
-                  <a16:creationId xmlns:a16="http://schemas.microsoft.com/office/drawing/2014/main" id="{EE9EE9DD-4219-4C6F-BCF5-B48D9535E62E}"/>
+                  <a16:creationId xmlns:a16="http://schemas.microsoft.com/office/drawing/2014/main" xmlns="" id="{EE9EE9DD-4219-4C6F-BCF5-B48D9535E62E}"/>
                 </a:ext>
               </a:extLst>
             </p:cNvPr>
@@ -10789,7 +11359,7 @@
           <p:cNvPr id="9" name="직각 삼각형 23">
             <a:extLst>
               <a:ext uri="{FF2B5EF4-FFF2-40B4-BE49-F238E27FC236}">
-                <a16:creationId xmlns:a16="http://schemas.microsoft.com/office/drawing/2014/main" id="{A21687B3-DD91-4897-B11B-1D36E99F5FBD}"/>
+                <a16:creationId xmlns:a16="http://schemas.microsoft.com/office/drawing/2014/main" xmlns="" id="{A21687B3-DD91-4897-B11B-1D36E99F5FBD}"/>
               </a:ext>
             </a:extLst>
           </p:cNvPr>
@@ -10871,7 +11441,7 @@
           <p:cNvPr id="10" name="사각형: 잘린 대각선 방향 모서리 18">
             <a:extLst>
               <a:ext uri="{FF2B5EF4-FFF2-40B4-BE49-F238E27FC236}">
-                <a16:creationId xmlns:a16="http://schemas.microsoft.com/office/drawing/2014/main" id="{AE988215-4041-4A4C-BC8C-DD558303ABAF}"/>
+                <a16:creationId xmlns:a16="http://schemas.microsoft.com/office/drawing/2014/main" xmlns="" id="{AE988215-4041-4A4C-BC8C-DD558303ABAF}"/>
               </a:ext>
             </a:extLst>
           </p:cNvPr>
@@ -15160,7 +15730,7 @@
           <p:cNvPr id="6" name="그룹 5">
             <a:extLst>
               <a:ext uri="{FF2B5EF4-FFF2-40B4-BE49-F238E27FC236}">
-                <a16:creationId xmlns:a16="http://schemas.microsoft.com/office/drawing/2014/main" id="{A87738A6-DCCB-44F8-BC8F-5630746B8082}"/>
+                <a16:creationId xmlns:a16="http://schemas.microsoft.com/office/drawing/2014/main" xmlns="" id="{A87738A6-DCCB-44F8-BC8F-5630746B8082}"/>
               </a:ext>
             </a:extLst>
           </p:cNvPr>
@@ -15180,7 +15750,7 @@
             <p:cNvPr id="3" name="TextBox 2">
               <a:extLst>
                 <a:ext uri="{FF2B5EF4-FFF2-40B4-BE49-F238E27FC236}">
-                  <a16:creationId xmlns:a16="http://schemas.microsoft.com/office/drawing/2014/main" id="{3F15D2F0-3EF3-4014-88BD-F1E9CEE28153}"/>
+                  <a16:creationId xmlns:a16="http://schemas.microsoft.com/office/drawing/2014/main" xmlns="" id="{3F15D2F0-3EF3-4014-88BD-F1E9CEE28153}"/>
                 </a:ext>
               </a:extLst>
             </p:cNvPr>
@@ -15238,7 +15808,7 @@
             <p:cNvPr id="4" name="TextBox 3">
               <a:extLst>
                 <a:ext uri="{FF2B5EF4-FFF2-40B4-BE49-F238E27FC236}">
-                  <a16:creationId xmlns:a16="http://schemas.microsoft.com/office/drawing/2014/main" id="{EE9EE9DD-4219-4C6F-BCF5-B48D9535E62E}"/>
+                  <a16:creationId xmlns:a16="http://schemas.microsoft.com/office/drawing/2014/main" xmlns="" id="{EE9EE9DD-4219-4C6F-BCF5-B48D9535E62E}"/>
                 </a:ext>
               </a:extLst>
             </p:cNvPr>
@@ -15308,7 +15878,7 @@
           <p:cNvPr id="9" name="직사각형 8">
             <a:extLst>
               <a:ext uri="{FF2B5EF4-FFF2-40B4-BE49-F238E27FC236}">
-                <a16:creationId xmlns:a16="http://schemas.microsoft.com/office/drawing/2014/main" id="{B946531F-0ED7-40C3-B576-4F56E0B23959}"/>
+                <a16:creationId xmlns:a16="http://schemas.microsoft.com/office/drawing/2014/main" xmlns="" id="{B946531F-0ED7-40C3-B576-4F56E0B23959}"/>
               </a:ext>
             </a:extLst>
           </p:cNvPr>
@@ -15362,7 +15932,7 @@
           <p:cNvPr id="24" name="직각 삼각형 23">
             <a:extLst>
               <a:ext uri="{FF2B5EF4-FFF2-40B4-BE49-F238E27FC236}">
-                <a16:creationId xmlns:a16="http://schemas.microsoft.com/office/drawing/2014/main" id="{A21687B3-DD91-4897-B11B-1D36E99F5FBD}"/>
+                <a16:creationId xmlns:a16="http://schemas.microsoft.com/office/drawing/2014/main" xmlns="" id="{A21687B3-DD91-4897-B11B-1D36E99F5FBD}"/>
               </a:ext>
             </a:extLst>
           </p:cNvPr>
@@ -15414,7 +15984,7 @@
           <p:cNvPr id="18" name="직사각형 17">
             <a:extLst>
               <a:ext uri="{FF2B5EF4-FFF2-40B4-BE49-F238E27FC236}">
-                <a16:creationId xmlns:a16="http://schemas.microsoft.com/office/drawing/2014/main" id="{FC56DBEE-CFA2-427D-A54E-C69EBB5FAD8F}"/>
+                <a16:creationId xmlns:a16="http://schemas.microsoft.com/office/drawing/2014/main" xmlns="" id="{FC56DBEE-CFA2-427D-A54E-C69EBB5FAD8F}"/>
               </a:ext>
             </a:extLst>
           </p:cNvPr>
@@ -15468,7 +16038,7 @@
           <p:cNvPr id="5" name="그림 4">
             <a:extLst>
               <a:ext uri="{FF2B5EF4-FFF2-40B4-BE49-F238E27FC236}">
-                <a16:creationId xmlns:a16="http://schemas.microsoft.com/office/drawing/2014/main" id="{FAA7C14E-59D4-4E2F-9433-BCBA2BA519B9}"/>
+                <a16:creationId xmlns:a16="http://schemas.microsoft.com/office/drawing/2014/main" xmlns="" id="{FAA7C14E-59D4-4E2F-9433-BCBA2BA519B9}"/>
               </a:ext>
             </a:extLst>
           </p:cNvPr>
@@ -15504,7 +16074,7 @@
           <p:cNvPr id="16" name="이등변 삼각형 15">
             <a:extLst>
               <a:ext uri="{FF2B5EF4-FFF2-40B4-BE49-F238E27FC236}">
-                <a16:creationId xmlns:a16="http://schemas.microsoft.com/office/drawing/2014/main" id="{6A579E04-95AD-4A49-B2DC-F82AC5E07A92}"/>
+                <a16:creationId xmlns:a16="http://schemas.microsoft.com/office/drawing/2014/main" xmlns="" id="{6A579E04-95AD-4A49-B2DC-F82AC5E07A92}"/>
               </a:ext>
             </a:extLst>
           </p:cNvPr>
@@ -15558,7 +16128,7 @@
           <p:cNvPr id="14" name="텍스트 상자 13">
             <a:extLst>
               <a:ext uri="{FF2B5EF4-FFF2-40B4-BE49-F238E27FC236}">
-                <a16:creationId xmlns:a16="http://schemas.microsoft.com/office/drawing/2014/main" id="{18FDB7F7-5093-4D6B-88A4-B1BA074FCE77}"/>
+                <a16:creationId xmlns:a16="http://schemas.microsoft.com/office/drawing/2014/main" xmlns="" id="{18FDB7F7-5093-4D6B-88A4-B1BA074FCE77}"/>
               </a:ext>
             </a:extLst>
           </p:cNvPr>
@@ -15598,7 +16168,7 @@
           <p:cNvPr id="15" name="텍스트 상자 13">
             <a:extLst>
               <a:ext uri="{FF2B5EF4-FFF2-40B4-BE49-F238E27FC236}">
-                <a16:creationId xmlns:a16="http://schemas.microsoft.com/office/drawing/2014/main" id="{AE72C7A1-1B2E-4847-A0F3-B32192D206C7}"/>
+                <a16:creationId xmlns:a16="http://schemas.microsoft.com/office/drawing/2014/main" xmlns="" id="{AE72C7A1-1B2E-4847-A0F3-B32192D206C7}"/>
               </a:ext>
             </a:extLst>
           </p:cNvPr>
@@ -15698,7 +16268,7 @@
           <p:cNvPr id="17" name="그림 6">
             <a:extLst>
               <a:ext uri="{FF2B5EF4-FFF2-40B4-BE49-F238E27FC236}">
-                <a16:creationId xmlns:a16="http://schemas.microsoft.com/office/drawing/2014/main" id="{FC930A71-E777-4CDF-8FCB-3CCCF2523DAE}"/>
+                <a16:creationId xmlns:a16="http://schemas.microsoft.com/office/drawing/2014/main" xmlns="" id="{FC930A71-E777-4CDF-8FCB-3CCCF2523DAE}"/>
               </a:ext>
             </a:extLst>
           </p:cNvPr>
@@ -15757,7 +16327,7 @@
           <p:cNvPr id="6" name="그룹 5">
             <a:extLst>
               <a:ext uri="{FF2B5EF4-FFF2-40B4-BE49-F238E27FC236}">
-                <a16:creationId xmlns:a16="http://schemas.microsoft.com/office/drawing/2014/main" id="{A87738A6-DCCB-44F8-BC8F-5630746B8082}"/>
+                <a16:creationId xmlns:a16="http://schemas.microsoft.com/office/drawing/2014/main" xmlns="" id="{A87738A6-DCCB-44F8-BC8F-5630746B8082}"/>
               </a:ext>
             </a:extLst>
           </p:cNvPr>
@@ -15777,7 +16347,7 @@
             <p:cNvPr id="3" name="TextBox 2">
               <a:extLst>
                 <a:ext uri="{FF2B5EF4-FFF2-40B4-BE49-F238E27FC236}">
-                  <a16:creationId xmlns:a16="http://schemas.microsoft.com/office/drawing/2014/main" id="{3F15D2F0-3EF3-4014-88BD-F1E9CEE28153}"/>
+                  <a16:creationId xmlns:a16="http://schemas.microsoft.com/office/drawing/2014/main" xmlns="" id="{3F15D2F0-3EF3-4014-88BD-F1E9CEE28153}"/>
                 </a:ext>
               </a:extLst>
             </p:cNvPr>
@@ -15835,7 +16405,7 @@
             <p:cNvPr id="4" name="TextBox 3">
               <a:extLst>
                 <a:ext uri="{FF2B5EF4-FFF2-40B4-BE49-F238E27FC236}">
-                  <a16:creationId xmlns:a16="http://schemas.microsoft.com/office/drawing/2014/main" id="{EE9EE9DD-4219-4C6F-BCF5-B48D9535E62E}"/>
+                  <a16:creationId xmlns:a16="http://schemas.microsoft.com/office/drawing/2014/main" xmlns="" id="{EE9EE9DD-4219-4C6F-BCF5-B48D9535E62E}"/>
                 </a:ext>
               </a:extLst>
             </p:cNvPr>
@@ -15905,7 +16475,7 @@
           <p:cNvPr id="9" name="직사각형 8">
             <a:extLst>
               <a:ext uri="{FF2B5EF4-FFF2-40B4-BE49-F238E27FC236}">
-                <a16:creationId xmlns:a16="http://schemas.microsoft.com/office/drawing/2014/main" id="{B946531F-0ED7-40C3-B576-4F56E0B23959}"/>
+                <a16:creationId xmlns:a16="http://schemas.microsoft.com/office/drawing/2014/main" xmlns="" id="{B946531F-0ED7-40C3-B576-4F56E0B23959}"/>
               </a:ext>
             </a:extLst>
           </p:cNvPr>
@@ -15959,7 +16529,7 @@
           <p:cNvPr id="24" name="직각 삼각형 23">
             <a:extLst>
               <a:ext uri="{FF2B5EF4-FFF2-40B4-BE49-F238E27FC236}">
-                <a16:creationId xmlns:a16="http://schemas.microsoft.com/office/drawing/2014/main" id="{A21687B3-DD91-4897-B11B-1D36E99F5FBD}"/>
+                <a16:creationId xmlns:a16="http://schemas.microsoft.com/office/drawing/2014/main" xmlns="" id="{A21687B3-DD91-4897-B11B-1D36E99F5FBD}"/>
               </a:ext>
             </a:extLst>
           </p:cNvPr>
@@ -16011,7 +16581,7 @@
           <p:cNvPr id="18" name="직사각형 17">
             <a:extLst>
               <a:ext uri="{FF2B5EF4-FFF2-40B4-BE49-F238E27FC236}">
-                <a16:creationId xmlns:a16="http://schemas.microsoft.com/office/drawing/2014/main" id="{FC56DBEE-CFA2-427D-A54E-C69EBB5FAD8F}"/>
+                <a16:creationId xmlns:a16="http://schemas.microsoft.com/office/drawing/2014/main" xmlns="" id="{FC56DBEE-CFA2-427D-A54E-C69EBB5FAD8F}"/>
               </a:ext>
             </a:extLst>
           </p:cNvPr>
@@ -16065,7 +16635,7 @@
           <p:cNvPr id="5" name="그림 4">
             <a:extLst>
               <a:ext uri="{FF2B5EF4-FFF2-40B4-BE49-F238E27FC236}">
-                <a16:creationId xmlns:a16="http://schemas.microsoft.com/office/drawing/2014/main" id="{FAA7C14E-59D4-4E2F-9433-BCBA2BA519B9}"/>
+                <a16:creationId xmlns:a16="http://schemas.microsoft.com/office/drawing/2014/main" xmlns="" id="{FAA7C14E-59D4-4E2F-9433-BCBA2BA519B9}"/>
               </a:ext>
             </a:extLst>
           </p:cNvPr>
@@ -16094,7 +16664,7 @@
           <p:cNvPr id="16" name="이등변 삼각형 15">
             <a:extLst>
               <a:ext uri="{FF2B5EF4-FFF2-40B4-BE49-F238E27FC236}">
-                <a16:creationId xmlns:a16="http://schemas.microsoft.com/office/drawing/2014/main" id="{6A579E04-95AD-4A49-B2DC-F82AC5E07A92}"/>
+                <a16:creationId xmlns:a16="http://schemas.microsoft.com/office/drawing/2014/main" xmlns="" id="{6A579E04-95AD-4A49-B2DC-F82AC5E07A92}"/>
               </a:ext>
             </a:extLst>
           </p:cNvPr>
@@ -16148,7 +16718,7 @@
           <p:cNvPr id="13" name="표 12">
             <a:extLst>
               <a:ext uri="{FF2B5EF4-FFF2-40B4-BE49-F238E27FC236}">
-                <a16:creationId xmlns:a16="http://schemas.microsoft.com/office/drawing/2014/main" id="{6935E920-AC64-4086-92AA-2E1CED4A13BB}"/>
+                <a16:creationId xmlns:a16="http://schemas.microsoft.com/office/drawing/2014/main" xmlns="" id="{6935E920-AC64-4086-92AA-2E1CED4A13BB}"/>
               </a:ext>
             </a:extLst>
           </p:cNvPr>
@@ -16173,42 +16743,42 @@
                 <a:gridCol w="812800">
                   <a:extLst>
                     <a:ext uri="{9D8B030D-6E8A-4147-A177-3AD203B41FA5}">
-                      <a16:colId xmlns:a16="http://schemas.microsoft.com/office/drawing/2014/main" val="20000"/>
+                      <a16:colId xmlns:a16="http://schemas.microsoft.com/office/drawing/2014/main" xmlns="" val="20000"/>
                     </a:ext>
                   </a:extLst>
                 </a:gridCol>
                 <a:gridCol w="812800">
                   <a:extLst>
                     <a:ext uri="{9D8B030D-6E8A-4147-A177-3AD203B41FA5}">
-                      <a16:colId xmlns:a16="http://schemas.microsoft.com/office/drawing/2014/main" val="20001"/>
+                      <a16:colId xmlns:a16="http://schemas.microsoft.com/office/drawing/2014/main" xmlns="" val="20001"/>
                     </a:ext>
                   </a:extLst>
                 </a:gridCol>
                 <a:gridCol w="812800">
                   <a:extLst>
                     <a:ext uri="{9D8B030D-6E8A-4147-A177-3AD203B41FA5}">
-                      <a16:colId xmlns:a16="http://schemas.microsoft.com/office/drawing/2014/main" val="20002"/>
+                      <a16:colId xmlns:a16="http://schemas.microsoft.com/office/drawing/2014/main" xmlns="" val="20002"/>
                     </a:ext>
                   </a:extLst>
                 </a:gridCol>
                 <a:gridCol w="812800">
                   <a:extLst>
                     <a:ext uri="{9D8B030D-6E8A-4147-A177-3AD203B41FA5}">
-                      <a16:colId xmlns:a16="http://schemas.microsoft.com/office/drawing/2014/main" val="20003"/>
+                      <a16:colId xmlns:a16="http://schemas.microsoft.com/office/drawing/2014/main" xmlns="" val="20003"/>
                     </a:ext>
                   </a:extLst>
                 </a:gridCol>
                 <a:gridCol w="812800">
                   <a:extLst>
                     <a:ext uri="{9D8B030D-6E8A-4147-A177-3AD203B41FA5}">
-                      <a16:colId xmlns:a16="http://schemas.microsoft.com/office/drawing/2014/main" val="20004"/>
+                      <a16:colId xmlns:a16="http://schemas.microsoft.com/office/drawing/2014/main" xmlns="" val="20004"/>
                     </a:ext>
                   </a:extLst>
                 </a:gridCol>
                 <a:gridCol w="812800">
                   <a:extLst>
                     <a:ext uri="{9D8B030D-6E8A-4147-A177-3AD203B41FA5}">
-                      <a16:colId xmlns:a16="http://schemas.microsoft.com/office/drawing/2014/main" val="863816877"/>
+                      <a16:colId xmlns:a16="http://schemas.microsoft.com/office/drawing/2014/main" xmlns="" val="863816877"/>
                     </a:ext>
                   </a:extLst>
                 </a:gridCol>
@@ -16322,7 +16892,7 @@
                 </a:tc>
                 <a:extLst>
                   <a:ext uri="{0D108BD9-81ED-4DB2-BD59-A6C34878D82A}">
-                    <a16:rowId xmlns:a16="http://schemas.microsoft.com/office/drawing/2014/main" val="10000"/>
+                    <a16:rowId xmlns:a16="http://schemas.microsoft.com/office/drawing/2014/main" xmlns="" val="10000"/>
                   </a:ext>
                 </a:extLst>
               </a:tr>
@@ -16398,7 +16968,7 @@
                 </a:tc>
                 <a:extLst>
                   <a:ext uri="{0D108BD9-81ED-4DB2-BD59-A6C34878D82A}">
-                    <a16:rowId xmlns:a16="http://schemas.microsoft.com/office/drawing/2014/main" val="10001"/>
+                    <a16:rowId xmlns:a16="http://schemas.microsoft.com/office/drawing/2014/main" xmlns="" val="10001"/>
                   </a:ext>
                 </a:extLst>
               </a:tr>
@@ -16474,7 +17044,7 @@
                 </a:tc>
                 <a:extLst>
                   <a:ext uri="{0D108BD9-81ED-4DB2-BD59-A6C34878D82A}">
-                    <a16:rowId xmlns:a16="http://schemas.microsoft.com/office/drawing/2014/main" val="4172954605"/>
+                    <a16:rowId xmlns:a16="http://schemas.microsoft.com/office/drawing/2014/main" xmlns="" val="4172954605"/>
                   </a:ext>
                 </a:extLst>
               </a:tr>
@@ -16553,7 +17123,7 @@
                 </a:tc>
                 <a:extLst>
                   <a:ext uri="{0D108BD9-81ED-4DB2-BD59-A6C34878D82A}">
-                    <a16:rowId xmlns:a16="http://schemas.microsoft.com/office/drawing/2014/main" val="1751226854"/>
+                    <a16:rowId xmlns:a16="http://schemas.microsoft.com/office/drawing/2014/main" xmlns="" val="1751226854"/>
                   </a:ext>
                 </a:extLst>
               </a:tr>
@@ -16629,7 +17199,7 @@
                 </a:tc>
                 <a:extLst>
                   <a:ext uri="{0D108BD9-81ED-4DB2-BD59-A6C34878D82A}">
-                    <a16:rowId xmlns:a16="http://schemas.microsoft.com/office/drawing/2014/main" val="3084563420"/>
+                    <a16:rowId xmlns:a16="http://schemas.microsoft.com/office/drawing/2014/main" xmlns="" val="3084563420"/>
                   </a:ext>
                 </a:extLst>
               </a:tr>
@@ -16705,7 +17275,7 @@
                 </a:tc>
                 <a:extLst>
                   <a:ext uri="{0D108BD9-81ED-4DB2-BD59-A6C34878D82A}">
-                    <a16:rowId xmlns:a16="http://schemas.microsoft.com/office/drawing/2014/main" val="560322244"/>
+                    <a16:rowId xmlns:a16="http://schemas.microsoft.com/office/drawing/2014/main" xmlns="" val="560322244"/>
                   </a:ext>
                 </a:extLst>
               </a:tr>
@@ -16781,7 +17351,7 @@
                 </a:tc>
                 <a:extLst>
                   <a:ext uri="{0D108BD9-81ED-4DB2-BD59-A6C34878D82A}">
-                    <a16:rowId xmlns:a16="http://schemas.microsoft.com/office/drawing/2014/main" val="277692938"/>
+                    <a16:rowId xmlns:a16="http://schemas.microsoft.com/office/drawing/2014/main" xmlns="" val="277692938"/>
                   </a:ext>
                 </a:extLst>
               </a:tr>
@@ -16794,7 +17364,7 @@
           <p:cNvPr id="14" name="텍스트 상자 13">
             <a:extLst>
               <a:ext uri="{FF2B5EF4-FFF2-40B4-BE49-F238E27FC236}">
-                <a16:creationId xmlns:a16="http://schemas.microsoft.com/office/drawing/2014/main" id="{18FDB7F7-5093-4D6B-88A4-B1BA074FCE77}"/>
+                <a16:creationId xmlns:a16="http://schemas.microsoft.com/office/drawing/2014/main" xmlns="" id="{18FDB7F7-5093-4D6B-88A4-B1BA074FCE77}"/>
               </a:ext>
             </a:extLst>
           </p:cNvPr>
@@ -16834,7 +17404,7 @@
           <p:cNvPr id="15" name="텍스트 상자 13">
             <a:extLst>
               <a:ext uri="{FF2B5EF4-FFF2-40B4-BE49-F238E27FC236}">
-                <a16:creationId xmlns:a16="http://schemas.microsoft.com/office/drawing/2014/main" id="{AE72C7A1-1B2E-4847-A0F3-B32192D206C7}"/>
+                <a16:creationId xmlns:a16="http://schemas.microsoft.com/office/drawing/2014/main" xmlns="" id="{AE72C7A1-1B2E-4847-A0F3-B32192D206C7}"/>
               </a:ext>
             </a:extLst>
           </p:cNvPr>
@@ -16903,7 +17473,7 @@
           <p:cNvPr id="4" name="직사각형 3">
             <a:extLst>
               <a:ext uri="{FF2B5EF4-FFF2-40B4-BE49-F238E27FC236}">
-                <a16:creationId xmlns:a16="http://schemas.microsoft.com/office/drawing/2014/main" id="{FC56DBEE-CFA2-427D-A54E-C69EBB5FAD8F}"/>
+                <a16:creationId xmlns:a16="http://schemas.microsoft.com/office/drawing/2014/main" xmlns="" id="{FC56DBEE-CFA2-427D-A54E-C69EBB5FAD8F}"/>
               </a:ext>
             </a:extLst>
           </p:cNvPr>
@@ -16957,7 +17527,7 @@
           <p:cNvPr id="5" name="직사각형 4">
             <a:extLst>
               <a:ext uri="{FF2B5EF4-FFF2-40B4-BE49-F238E27FC236}">
-                <a16:creationId xmlns:a16="http://schemas.microsoft.com/office/drawing/2014/main" id="{B946531F-0ED7-40C3-B576-4F56E0B23959}"/>
+                <a16:creationId xmlns:a16="http://schemas.microsoft.com/office/drawing/2014/main" xmlns="" id="{B946531F-0ED7-40C3-B576-4F56E0B23959}"/>
               </a:ext>
             </a:extLst>
           </p:cNvPr>
@@ -17011,7 +17581,7 @@
           <p:cNvPr id="6" name="그룹 5">
             <a:extLst>
               <a:ext uri="{FF2B5EF4-FFF2-40B4-BE49-F238E27FC236}">
-                <a16:creationId xmlns:a16="http://schemas.microsoft.com/office/drawing/2014/main" id="{A87738A6-DCCB-44F8-BC8F-5630746B8082}"/>
+                <a16:creationId xmlns:a16="http://schemas.microsoft.com/office/drawing/2014/main" xmlns="" id="{A87738A6-DCCB-44F8-BC8F-5630746B8082}"/>
               </a:ext>
             </a:extLst>
           </p:cNvPr>
@@ -17031,7 +17601,7 @@
             <p:cNvPr id="7" name="TextBox 2">
               <a:extLst>
                 <a:ext uri="{FF2B5EF4-FFF2-40B4-BE49-F238E27FC236}">
-                  <a16:creationId xmlns:a16="http://schemas.microsoft.com/office/drawing/2014/main" id="{3F15D2F0-3EF3-4014-88BD-F1E9CEE28153}"/>
+                  <a16:creationId xmlns:a16="http://schemas.microsoft.com/office/drawing/2014/main" xmlns="" id="{3F15D2F0-3EF3-4014-88BD-F1E9CEE28153}"/>
                 </a:ext>
               </a:extLst>
             </p:cNvPr>
@@ -17089,7 +17659,7 @@
             <p:cNvPr id="8" name="TextBox 3">
               <a:extLst>
                 <a:ext uri="{FF2B5EF4-FFF2-40B4-BE49-F238E27FC236}">
-                  <a16:creationId xmlns:a16="http://schemas.microsoft.com/office/drawing/2014/main" id="{EE9EE9DD-4219-4C6F-BCF5-B48D9535E62E}"/>
+                  <a16:creationId xmlns:a16="http://schemas.microsoft.com/office/drawing/2014/main" xmlns="" id="{EE9EE9DD-4219-4C6F-BCF5-B48D9535E62E}"/>
                 </a:ext>
               </a:extLst>
             </p:cNvPr>
@@ -17159,7 +17729,7 @@
           <p:cNvPr id="9" name="직각 삼각형 23">
             <a:extLst>
               <a:ext uri="{FF2B5EF4-FFF2-40B4-BE49-F238E27FC236}">
-                <a16:creationId xmlns:a16="http://schemas.microsoft.com/office/drawing/2014/main" id="{A21687B3-DD91-4897-B11B-1D36E99F5FBD}"/>
+                <a16:creationId xmlns:a16="http://schemas.microsoft.com/office/drawing/2014/main" xmlns="" id="{A21687B3-DD91-4897-B11B-1D36E99F5FBD}"/>
               </a:ext>
             </a:extLst>
           </p:cNvPr>
@@ -17241,7 +17811,7 @@
           <p:cNvPr id="10" name="사각형: 잘린 대각선 방향 모서리 18">
             <a:extLst>
               <a:ext uri="{FF2B5EF4-FFF2-40B4-BE49-F238E27FC236}">
-                <a16:creationId xmlns:a16="http://schemas.microsoft.com/office/drawing/2014/main" id="{AE988215-4041-4A4C-BC8C-DD558303ABAF}"/>
+                <a16:creationId xmlns:a16="http://schemas.microsoft.com/office/drawing/2014/main" xmlns="" id="{AE988215-4041-4A4C-BC8C-DD558303ABAF}"/>
               </a:ext>
             </a:extLst>
           </p:cNvPr>
@@ -17583,7 +18153,7 @@
           <p:cNvPr id="4" name="직사각형 3">
             <a:extLst>
               <a:ext uri="{FF2B5EF4-FFF2-40B4-BE49-F238E27FC236}">
-                <a16:creationId xmlns:a16="http://schemas.microsoft.com/office/drawing/2014/main" id="{FC56DBEE-CFA2-427D-A54E-C69EBB5FAD8F}"/>
+                <a16:creationId xmlns:a16="http://schemas.microsoft.com/office/drawing/2014/main" xmlns="" id="{FC56DBEE-CFA2-427D-A54E-C69EBB5FAD8F}"/>
               </a:ext>
             </a:extLst>
           </p:cNvPr>
@@ -17637,7 +18207,7 @@
           <p:cNvPr id="5" name="직사각형 4">
             <a:extLst>
               <a:ext uri="{FF2B5EF4-FFF2-40B4-BE49-F238E27FC236}">
-                <a16:creationId xmlns:a16="http://schemas.microsoft.com/office/drawing/2014/main" id="{B946531F-0ED7-40C3-B576-4F56E0B23959}"/>
+                <a16:creationId xmlns:a16="http://schemas.microsoft.com/office/drawing/2014/main" xmlns="" id="{B946531F-0ED7-40C3-B576-4F56E0B23959}"/>
               </a:ext>
             </a:extLst>
           </p:cNvPr>
@@ -17691,7 +18261,7 @@
           <p:cNvPr id="6" name="그룹 5">
             <a:extLst>
               <a:ext uri="{FF2B5EF4-FFF2-40B4-BE49-F238E27FC236}">
-                <a16:creationId xmlns:a16="http://schemas.microsoft.com/office/drawing/2014/main" id="{A87738A6-DCCB-44F8-BC8F-5630746B8082}"/>
+                <a16:creationId xmlns:a16="http://schemas.microsoft.com/office/drawing/2014/main" xmlns="" id="{A87738A6-DCCB-44F8-BC8F-5630746B8082}"/>
               </a:ext>
             </a:extLst>
           </p:cNvPr>
@@ -17711,7 +18281,7 @@
             <p:cNvPr id="7" name="TextBox 2">
               <a:extLst>
                 <a:ext uri="{FF2B5EF4-FFF2-40B4-BE49-F238E27FC236}">
-                  <a16:creationId xmlns:a16="http://schemas.microsoft.com/office/drawing/2014/main" id="{3F15D2F0-3EF3-4014-88BD-F1E9CEE28153}"/>
+                  <a16:creationId xmlns:a16="http://schemas.microsoft.com/office/drawing/2014/main" xmlns="" id="{3F15D2F0-3EF3-4014-88BD-F1E9CEE28153}"/>
                 </a:ext>
               </a:extLst>
             </p:cNvPr>
@@ -17769,7 +18339,7 @@
             <p:cNvPr id="8" name="TextBox 3">
               <a:extLst>
                 <a:ext uri="{FF2B5EF4-FFF2-40B4-BE49-F238E27FC236}">
-                  <a16:creationId xmlns:a16="http://schemas.microsoft.com/office/drawing/2014/main" id="{EE9EE9DD-4219-4C6F-BCF5-B48D9535E62E}"/>
+                  <a16:creationId xmlns:a16="http://schemas.microsoft.com/office/drawing/2014/main" xmlns="" id="{EE9EE9DD-4219-4C6F-BCF5-B48D9535E62E}"/>
                 </a:ext>
               </a:extLst>
             </p:cNvPr>
@@ -17839,7 +18409,7 @@
           <p:cNvPr id="9" name="직각 삼각형 23">
             <a:extLst>
               <a:ext uri="{FF2B5EF4-FFF2-40B4-BE49-F238E27FC236}">
-                <a16:creationId xmlns:a16="http://schemas.microsoft.com/office/drawing/2014/main" id="{A21687B3-DD91-4897-B11B-1D36E99F5FBD}"/>
+                <a16:creationId xmlns:a16="http://schemas.microsoft.com/office/drawing/2014/main" xmlns="" id="{A21687B3-DD91-4897-B11B-1D36E99F5FBD}"/>
               </a:ext>
             </a:extLst>
           </p:cNvPr>
@@ -17921,7 +18491,7 @@
           <p:cNvPr id="10" name="사각형: 잘린 대각선 방향 모서리 18">
             <a:extLst>
               <a:ext uri="{FF2B5EF4-FFF2-40B4-BE49-F238E27FC236}">
-                <a16:creationId xmlns:a16="http://schemas.microsoft.com/office/drawing/2014/main" id="{AE988215-4041-4A4C-BC8C-DD558303ABAF}"/>
+                <a16:creationId xmlns:a16="http://schemas.microsoft.com/office/drawing/2014/main" xmlns="" id="{AE988215-4041-4A4C-BC8C-DD558303ABAF}"/>
               </a:ext>
             </a:extLst>
           </p:cNvPr>
@@ -18290,7 +18860,7 @@
           <p:cNvPr id="18" name="직사각형 17">
             <a:extLst>
               <a:ext uri="{FF2B5EF4-FFF2-40B4-BE49-F238E27FC236}">
-                <a16:creationId xmlns:a16="http://schemas.microsoft.com/office/drawing/2014/main" id="{FC56DBEE-CFA2-427D-A54E-C69EBB5FAD8F}"/>
+                <a16:creationId xmlns:a16="http://schemas.microsoft.com/office/drawing/2014/main" xmlns="" id="{FC56DBEE-CFA2-427D-A54E-C69EBB5FAD8F}"/>
               </a:ext>
             </a:extLst>
           </p:cNvPr>
@@ -18344,7 +18914,7 @@
           <p:cNvPr id="2" name="그림 1">
             <a:extLst>
               <a:ext uri="{FF2B5EF4-FFF2-40B4-BE49-F238E27FC236}">
-                <a16:creationId xmlns:a16="http://schemas.microsoft.com/office/drawing/2014/main" id="{8072468B-AEB7-43D1-95B0-CDC8F8A8A6C6}"/>
+                <a16:creationId xmlns:a16="http://schemas.microsoft.com/office/drawing/2014/main" xmlns="" id="{8072468B-AEB7-43D1-95B0-CDC8F8A8A6C6}"/>
               </a:ext>
             </a:extLst>
           </p:cNvPr>
@@ -18374,7 +18944,7 @@
           <p:cNvPr id="6" name="그룹 5">
             <a:extLst>
               <a:ext uri="{FF2B5EF4-FFF2-40B4-BE49-F238E27FC236}">
-                <a16:creationId xmlns:a16="http://schemas.microsoft.com/office/drawing/2014/main" id="{A87738A6-DCCB-44F8-BC8F-5630746B8082}"/>
+                <a16:creationId xmlns:a16="http://schemas.microsoft.com/office/drawing/2014/main" xmlns="" id="{A87738A6-DCCB-44F8-BC8F-5630746B8082}"/>
               </a:ext>
             </a:extLst>
           </p:cNvPr>
@@ -18394,7 +18964,7 @@
             <p:cNvPr id="3" name="TextBox 2">
               <a:extLst>
                 <a:ext uri="{FF2B5EF4-FFF2-40B4-BE49-F238E27FC236}">
-                  <a16:creationId xmlns:a16="http://schemas.microsoft.com/office/drawing/2014/main" id="{3F15D2F0-3EF3-4014-88BD-F1E9CEE28153}"/>
+                  <a16:creationId xmlns:a16="http://schemas.microsoft.com/office/drawing/2014/main" xmlns="" id="{3F15D2F0-3EF3-4014-88BD-F1E9CEE28153}"/>
                 </a:ext>
               </a:extLst>
             </p:cNvPr>
@@ -18452,7 +19022,7 @@
             <p:cNvPr id="4" name="TextBox 3">
               <a:extLst>
                 <a:ext uri="{FF2B5EF4-FFF2-40B4-BE49-F238E27FC236}">
-                  <a16:creationId xmlns:a16="http://schemas.microsoft.com/office/drawing/2014/main" id="{EE9EE9DD-4219-4C6F-BCF5-B48D9535E62E}"/>
+                  <a16:creationId xmlns:a16="http://schemas.microsoft.com/office/drawing/2014/main" xmlns="" id="{EE9EE9DD-4219-4C6F-BCF5-B48D9535E62E}"/>
                 </a:ext>
               </a:extLst>
             </p:cNvPr>
@@ -18522,7 +19092,7 @@
           <p:cNvPr id="9" name="직사각형 8">
             <a:extLst>
               <a:ext uri="{FF2B5EF4-FFF2-40B4-BE49-F238E27FC236}">
-                <a16:creationId xmlns:a16="http://schemas.microsoft.com/office/drawing/2014/main" id="{B946531F-0ED7-40C3-B576-4F56E0B23959}"/>
+                <a16:creationId xmlns:a16="http://schemas.microsoft.com/office/drawing/2014/main" xmlns="" id="{B946531F-0ED7-40C3-B576-4F56E0B23959}"/>
               </a:ext>
             </a:extLst>
           </p:cNvPr>
@@ -18576,7 +19146,7 @@
           <p:cNvPr id="24" name="직각 삼각형 23">
             <a:extLst>
               <a:ext uri="{FF2B5EF4-FFF2-40B4-BE49-F238E27FC236}">
-                <a16:creationId xmlns:a16="http://schemas.microsoft.com/office/drawing/2014/main" id="{A21687B3-DD91-4897-B11B-1D36E99F5FBD}"/>
+                <a16:creationId xmlns:a16="http://schemas.microsoft.com/office/drawing/2014/main" xmlns="" id="{A21687B3-DD91-4897-B11B-1D36E99F5FBD}"/>
               </a:ext>
             </a:extLst>
           </p:cNvPr>
@@ -18628,7 +19198,7 @@
           <p:cNvPr id="17" name="사각형: 잘린 대각선 방향 모서리 16">
             <a:extLst>
               <a:ext uri="{FF2B5EF4-FFF2-40B4-BE49-F238E27FC236}">
-                <a16:creationId xmlns:a16="http://schemas.microsoft.com/office/drawing/2014/main" id="{B275F779-1A97-4327-876B-A5BA9DE1FC03}"/>
+                <a16:creationId xmlns:a16="http://schemas.microsoft.com/office/drawing/2014/main" xmlns="" id="{B275F779-1A97-4327-876B-A5BA9DE1FC03}"/>
               </a:ext>
             </a:extLst>
           </p:cNvPr>
@@ -18696,7 +19266,7 @@
           <p:cNvPr id="20" name="타원 19">
             <a:extLst>
               <a:ext uri="{FF2B5EF4-FFF2-40B4-BE49-F238E27FC236}">
-                <a16:creationId xmlns:a16="http://schemas.microsoft.com/office/drawing/2014/main" id="{BC4A4FB2-51EA-49AF-B300-D9C6B7E1C6AA}"/>
+                <a16:creationId xmlns:a16="http://schemas.microsoft.com/office/drawing/2014/main" xmlns="" id="{BC4A4FB2-51EA-49AF-B300-D9C6B7E1C6AA}"/>
               </a:ext>
             </a:extLst>
           </p:cNvPr>
@@ -18750,7 +19320,7 @@
           <p:cNvPr id="21" name="타원 20">
             <a:extLst>
               <a:ext uri="{FF2B5EF4-FFF2-40B4-BE49-F238E27FC236}">
-                <a16:creationId xmlns:a16="http://schemas.microsoft.com/office/drawing/2014/main" id="{C969B8A6-0E86-44A1-AE1F-D2FB4051D31C}"/>
+                <a16:creationId xmlns:a16="http://schemas.microsoft.com/office/drawing/2014/main" xmlns="" id="{C969B8A6-0E86-44A1-AE1F-D2FB4051D31C}"/>
               </a:ext>
             </a:extLst>
           </p:cNvPr>
@@ -18804,7 +19374,7 @@
           <p:cNvPr id="26" name="직사각형 25">
             <a:extLst>
               <a:ext uri="{FF2B5EF4-FFF2-40B4-BE49-F238E27FC236}">
-                <a16:creationId xmlns:a16="http://schemas.microsoft.com/office/drawing/2014/main" id="{4872D681-9606-473E-852B-52FBB45983A7}"/>
+                <a16:creationId xmlns:a16="http://schemas.microsoft.com/office/drawing/2014/main" xmlns="" id="{4872D681-9606-473E-852B-52FBB45983A7}"/>
               </a:ext>
             </a:extLst>
           </p:cNvPr>
@@ -19670,7 +20240,7 @@
           <p:cNvPr id="27" name="타원 26">
             <a:extLst>
               <a:ext uri="{FF2B5EF4-FFF2-40B4-BE49-F238E27FC236}">
-                <a16:creationId xmlns:a16="http://schemas.microsoft.com/office/drawing/2014/main" id="{27BC121C-7CC1-4B12-84A7-FB8C4B78A469}"/>
+                <a16:creationId xmlns:a16="http://schemas.microsoft.com/office/drawing/2014/main" xmlns="" id="{27BC121C-7CC1-4B12-84A7-FB8C4B78A469}"/>
               </a:ext>
             </a:extLst>
           </p:cNvPr>
@@ -19724,7 +20294,7 @@
           <p:cNvPr id="22" name="타원 21">
             <a:extLst>
               <a:ext uri="{FF2B5EF4-FFF2-40B4-BE49-F238E27FC236}">
-                <a16:creationId xmlns:a16="http://schemas.microsoft.com/office/drawing/2014/main" id="{C68F243E-A897-4ECB-87CC-CDBA52DBFD12}"/>
+                <a16:creationId xmlns:a16="http://schemas.microsoft.com/office/drawing/2014/main" xmlns="" id="{C68F243E-A897-4ECB-87CC-CDBA52DBFD12}"/>
               </a:ext>
             </a:extLst>
           </p:cNvPr>
@@ -19778,7 +20348,7 @@
           <p:cNvPr id="23" name="타원 22">
             <a:extLst>
               <a:ext uri="{FF2B5EF4-FFF2-40B4-BE49-F238E27FC236}">
-                <a16:creationId xmlns:a16="http://schemas.microsoft.com/office/drawing/2014/main" id="{AA17F53E-9F63-4D3E-A954-6AB4CF33699B}"/>
+                <a16:creationId xmlns:a16="http://schemas.microsoft.com/office/drawing/2014/main" xmlns="" id="{AA17F53E-9F63-4D3E-A954-6AB4CF33699B}"/>
               </a:ext>
             </a:extLst>
           </p:cNvPr>
@@ -19832,7 +20402,7 @@
           <p:cNvPr id="25" name="타원 24">
             <a:extLst>
               <a:ext uri="{FF2B5EF4-FFF2-40B4-BE49-F238E27FC236}">
-                <a16:creationId xmlns:a16="http://schemas.microsoft.com/office/drawing/2014/main" id="{F64F584F-9B4E-40F7-A138-B3AEF61AD2BA}"/>
+                <a16:creationId xmlns:a16="http://schemas.microsoft.com/office/drawing/2014/main" xmlns="" id="{F64F584F-9B4E-40F7-A138-B3AEF61AD2BA}"/>
               </a:ext>
             </a:extLst>
           </p:cNvPr>
@@ -19886,7 +20456,7 @@
           <p:cNvPr id="28" name="타원 27">
             <a:extLst>
               <a:ext uri="{FF2B5EF4-FFF2-40B4-BE49-F238E27FC236}">
-                <a16:creationId xmlns:a16="http://schemas.microsoft.com/office/drawing/2014/main" id="{5B9B3E71-B3B1-4FF3-94F2-12E7C7913781}"/>
+                <a16:creationId xmlns:a16="http://schemas.microsoft.com/office/drawing/2014/main" xmlns="" id="{5B9B3E71-B3B1-4FF3-94F2-12E7C7913781}"/>
               </a:ext>
             </a:extLst>
           </p:cNvPr>
@@ -19940,7 +20510,7 @@
           <p:cNvPr id="29" name="타원 28">
             <a:extLst>
               <a:ext uri="{FF2B5EF4-FFF2-40B4-BE49-F238E27FC236}">
-                <a16:creationId xmlns:a16="http://schemas.microsoft.com/office/drawing/2014/main" id="{F85F1324-1292-426B-BB72-4F0EC113EAA3}"/>
+                <a16:creationId xmlns:a16="http://schemas.microsoft.com/office/drawing/2014/main" xmlns="" id="{F85F1324-1292-426B-BB72-4F0EC113EAA3}"/>
               </a:ext>
             </a:extLst>
           </p:cNvPr>
@@ -19994,7 +20564,7 @@
           <p:cNvPr id="30" name="타원 29">
             <a:extLst>
               <a:ext uri="{FF2B5EF4-FFF2-40B4-BE49-F238E27FC236}">
-                <a16:creationId xmlns:a16="http://schemas.microsoft.com/office/drawing/2014/main" id="{FA685177-A594-4E54-AE96-EB2E18EB9ACE}"/>
+                <a16:creationId xmlns:a16="http://schemas.microsoft.com/office/drawing/2014/main" xmlns="" id="{FA685177-A594-4E54-AE96-EB2E18EB9ACE}"/>
               </a:ext>
             </a:extLst>
           </p:cNvPr>
@@ -20048,7 +20618,7 @@
           <p:cNvPr id="32" name="직선 화살표 연결선 31">
             <a:extLst>
               <a:ext uri="{FF2B5EF4-FFF2-40B4-BE49-F238E27FC236}">
-                <a16:creationId xmlns:a16="http://schemas.microsoft.com/office/drawing/2014/main" id="{C911A864-A6DC-4997-B9E9-F8BC6D3B8D7E}"/>
+                <a16:creationId xmlns:a16="http://schemas.microsoft.com/office/drawing/2014/main" xmlns="" id="{C911A864-A6DC-4997-B9E9-F8BC6D3B8D7E}"/>
               </a:ext>
             </a:extLst>
           </p:cNvPr>
@@ -20092,7 +20662,7 @@
           <p:cNvPr id="14" name="화살표: 아래쪽 13">
             <a:extLst>
               <a:ext uri="{FF2B5EF4-FFF2-40B4-BE49-F238E27FC236}">
-                <a16:creationId xmlns:a16="http://schemas.microsoft.com/office/drawing/2014/main" id="{60B44A07-FFD2-4519-96C8-452F68947570}"/>
+                <a16:creationId xmlns:a16="http://schemas.microsoft.com/office/drawing/2014/main" xmlns="" id="{60B44A07-FFD2-4519-96C8-452F68947570}"/>
               </a:ext>
             </a:extLst>
           </p:cNvPr>
@@ -20146,7 +20716,7 @@
           <p:cNvPr id="34" name="타원 33">
             <a:extLst>
               <a:ext uri="{FF2B5EF4-FFF2-40B4-BE49-F238E27FC236}">
-                <a16:creationId xmlns:a16="http://schemas.microsoft.com/office/drawing/2014/main" id="{E6232360-DB32-477C-A325-EE1D23784928}"/>
+                <a16:creationId xmlns:a16="http://schemas.microsoft.com/office/drawing/2014/main" xmlns="" id="{E6232360-DB32-477C-A325-EE1D23784928}"/>
               </a:ext>
             </a:extLst>
           </p:cNvPr>
@@ -20200,7 +20770,7 @@
           <p:cNvPr id="43" name="직선 화살표 연결선 42">
             <a:extLst>
               <a:ext uri="{FF2B5EF4-FFF2-40B4-BE49-F238E27FC236}">
-                <a16:creationId xmlns:a16="http://schemas.microsoft.com/office/drawing/2014/main" id="{0E878D57-54B3-47C1-9056-2E07462CFE84}"/>
+                <a16:creationId xmlns:a16="http://schemas.microsoft.com/office/drawing/2014/main" xmlns="" id="{0E878D57-54B3-47C1-9056-2E07462CFE84}"/>
               </a:ext>
             </a:extLst>
           </p:cNvPr>
@@ -20244,7 +20814,7 @@
           <p:cNvPr id="44" name="직선 화살표 연결선 43">
             <a:extLst>
               <a:ext uri="{FF2B5EF4-FFF2-40B4-BE49-F238E27FC236}">
-                <a16:creationId xmlns:a16="http://schemas.microsoft.com/office/drawing/2014/main" id="{F25CCC98-B0EB-4DAA-9AAE-348251812BB4}"/>
+                <a16:creationId xmlns:a16="http://schemas.microsoft.com/office/drawing/2014/main" xmlns="" id="{F25CCC98-B0EB-4DAA-9AAE-348251812BB4}"/>
               </a:ext>
             </a:extLst>
           </p:cNvPr>
@@ -20288,7 +20858,7 @@
           <p:cNvPr id="47" name="타원 46">
             <a:extLst>
               <a:ext uri="{FF2B5EF4-FFF2-40B4-BE49-F238E27FC236}">
-                <a16:creationId xmlns:a16="http://schemas.microsoft.com/office/drawing/2014/main" id="{7F4F767B-FA1B-4ED9-8E72-11B5BBC096BD}"/>
+                <a16:creationId xmlns:a16="http://schemas.microsoft.com/office/drawing/2014/main" xmlns="" id="{7F4F767B-FA1B-4ED9-8E72-11B5BBC096BD}"/>
               </a:ext>
             </a:extLst>
           </p:cNvPr>
@@ -20342,7 +20912,7 @@
           <p:cNvPr id="48" name="직선 화살표 연결선 47">
             <a:extLst>
               <a:ext uri="{FF2B5EF4-FFF2-40B4-BE49-F238E27FC236}">
-                <a16:creationId xmlns:a16="http://schemas.microsoft.com/office/drawing/2014/main" id="{DFCACCE7-A28A-4C85-8D9E-F6D7B60A2C07}"/>
+                <a16:creationId xmlns:a16="http://schemas.microsoft.com/office/drawing/2014/main" xmlns="" id="{DFCACCE7-A28A-4C85-8D9E-F6D7B60A2C07}"/>
               </a:ext>
             </a:extLst>
           </p:cNvPr>
@@ -20386,7 +20956,7 @@
           <p:cNvPr id="53" name="직선 화살표 연결선 52">
             <a:extLst>
               <a:ext uri="{FF2B5EF4-FFF2-40B4-BE49-F238E27FC236}">
-                <a16:creationId xmlns:a16="http://schemas.microsoft.com/office/drawing/2014/main" id="{FBD9C4A3-16C4-49DB-9CA7-0CDC52BA8493}"/>
+                <a16:creationId xmlns:a16="http://schemas.microsoft.com/office/drawing/2014/main" xmlns="" id="{FBD9C4A3-16C4-49DB-9CA7-0CDC52BA8493}"/>
               </a:ext>
             </a:extLst>
           </p:cNvPr>
@@ -20430,7 +21000,7 @@
           <p:cNvPr id="35" name="직선 화살표 연결선 34">
             <a:extLst>
               <a:ext uri="{FF2B5EF4-FFF2-40B4-BE49-F238E27FC236}">
-                <a16:creationId xmlns:a16="http://schemas.microsoft.com/office/drawing/2014/main" id="{EFCE8B3D-1262-43AB-8B4D-6674F2E7BE83}"/>
+                <a16:creationId xmlns:a16="http://schemas.microsoft.com/office/drawing/2014/main" xmlns="" id="{EFCE8B3D-1262-43AB-8B4D-6674F2E7BE83}"/>
               </a:ext>
             </a:extLst>
           </p:cNvPr>
@@ -20474,7 +21044,7 @@
           <p:cNvPr id="40" name="화살표: 아래쪽 13">
             <a:extLst>
               <a:ext uri="{FF2B5EF4-FFF2-40B4-BE49-F238E27FC236}">
-                <a16:creationId xmlns:a16="http://schemas.microsoft.com/office/drawing/2014/main" id="{60B44A07-FFD2-4519-96C8-452F68947570}"/>
+                <a16:creationId xmlns:a16="http://schemas.microsoft.com/office/drawing/2014/main" xmlns="" id="{60B44A07-FFD2-4519-96C8-452F68947570}"/>
               </a:ext>
             </a:extLst>
           </p:cNvPr>

</xml_diff>